<commit_message>
adicionado explicacoes sobre sistema do Wil
</commit_message>
<xml_diff>
--- a/doc/pfc/Imagens/Imagens.pptx
+++ b/doc/pfc/Imagens/Imagens.pptx
@@ -7,6 +7,7 @@
   <p:sldIdLst>
     <p:sldId id="256" r:id="rId2"/>
     <p:sldId id="257" r:id="rId3"/>
+    <p:sldId id="258" r:id="rId4"/>
   </p:sldIdLst>
   <p:sldSz cx="12192000" cy="6858000"/>
   <p:notesSz cx="6858000" cy="9144000"/>
@@ -260,7 +261,7 @@
           <a:p>
             <a:fld id="{1B590A2A-F349-4206-8DF8-3C46CFD09084}" type="datetimeFigureOut">
               <a:rPr lang="pt-BR" smtClean="0"/>
-              <a:t>06/05/2019</a:t>
+              <a:t>08/05/2019</a:t>
             </a:fld>
             <a:endParaRPr lang="pt-BR"/>
           </a:p>
@@ -458,7 +459,7 @@
           <a:p>
             <a:fld id="{1B590A2A-F349-4206-8DF8-3C46CFD09084}" type="datetimeFigureOut">
               <a:rPr lang="pt-BR" smtClean="0"/>
-              <a:t>06/05/2019</a:t>
+              <a:t>08/05/2019</a:t>
             </a:fld>
             <a:endParaRPr lang="pt-BR"/>
           </a:p>
@@ -666,7 +667,7 @@
           <a:p>
             <a:fld id="{1B590A2A-F349-4206-8DF8-3C46CFD09084}" type="datetimeFigureOut">
               <a:rPr lang="pt-BR" smtClean="0"/>
-              <a:t>06/05/2019</a:t>
+              <a:t>08/05/2019</a:t>
             </a:fld>
             <a:endParaRPr lang="pt-BR"/>
           </a:p>
@@ -864,7 +865,7 @@
           <a:p>
             <a:fld id="{1B590A2A-F349-4206-8DF8-3C46CFD09084}" type="datetimeFigureOut">
               <a:rPr lang="pt-BR" smtClean="0"/>
-              <a:t>06/05/2019</a:t>
+              <a:t>08/05/2019</a:t>
             </a:fld>
             <a:endParaRPr lang="pt-BR"/>
           </a:p>
@@ -1139,7 +1140,7 @@
           <a:p>
             <a:fld id="{1B590A2A-F349-4206-8DF8-3C46CFD09084}" type="datetimeFigureOut">
               <a:rPr lang="pt-BR" smtClean="0"/>
-              <a:t>06/05/2019</a:t>
+              <a:t>08/05/2019</a:t>
             </a:fld>
             <a:endParaRPr lang="pt-BR"/>
           </a:p>
@@ -1404,7 +1405,7 @@
           <a:p>
             <a:fld id="{1B590A2A-F349-4206-8DF8-3C46CFD09084}" type="datetimeFigureOut">
               <a:rPr lang="pt-BR" smtClean="0"/>
-              <a:t>06/05/2019</a:t>
+              <a:t>08/05/2019</a:t>
             </a:fld>
             <a:endParaRPr lang="pt-BR"/>
           </a:p>
@@ -1816,7 +1817,7 @@
           <a:p>
             <a:fld id="{1B590A2A-F349-4206-8DF8-3C46CFD09084}" type="datetimeFigureOut">
               <a:rPr lang="pt-BR" smtClean="0"/>
-              <a:t>06/05/2019</a:t>
+              <a:t>08/05/2019</a:t>
             </a:fld>
             <a:endParaRPr lang="pt-BR"/>
           </a:p>
@@ -1957,7 +1958,7 @@
           <a:p>
             <a:fld id="{1B590A2A-F349-4206-8DF8-3C46CFD09084}" type="datetimeFigureOut">
               <a:rPr lang="pt-BR" smtClean="0"/>
-              <a:t>06/05/2019</a:t>
+              <a:t>08/05/2019</a:t>
             </a:fld>
             <a:endParaRPr lang="pt-BR"/>
           </a:p>
@@ -2070,7 +2071,7 @@
           <a:p>
             <a:fld id="{1B590A2A-F349-4206-8DF8-3C46CFD09084}" type="datetimeFigureOut">
               <a:rPr lang="pt-BR" smtClean="0"/>
-              <a:t>06/05/2019</a:t>
+              <a:t>08/05/2019</a:t>
             </a:fld>
             <a:endParaRPr lang="pt-BR"/>
           </a:p>
@@ -2381,7 +2382,7 @@
           <a:p>
             <a:fld id="{1B590A2A-F349-4206-8DF8-3C46CFD09084}" type="datetimeFigureOut">
               <a:rPr lang="pt-BR" smtClean="0"/>
-              <a:t>06/05/2019</a:t>
+              <a:t>08/05/2019</a:t>
             </a:fld>
             <a:endParaRPr lang="pt-BR"/>
           </a:p>
@@ -2669,7 +2670,7 @@
           <a:p>
             <a:fld id="{1B590A2A-F349-4206-8DF8-3C46CFD09084}" type="datetimeFigureOut">
               <a:rPr lang="pt-BR" smtClean="0"/>
-              <a:t>06/05/2019</a:t>
+              <a:t>08/05/2019</a:t>
             </a:fld>
             <a:endParaRPr lang="pt-BR"/>
           </a:p>
@@ -2910,7 +2911,7 @@
           <a:p>
             <a:fld id="{1B590A2A-F349-4206-8DF8-3C46CFD09084}" type="datetimeFigureOut">
               <a:rPr lang="pt-BR" smtClean="0"/>
-              <a:t>06/05/2019</a:t>
+              <a:t>08/05/2019</a:t>
             </a:fld>
             <a:endParaRPr lang="pt-BR"/>
           </a:p>
@@ -3478,6 +3479,71 @@
 </p:sld>
 </file>
 
+<file path=ppt/slides/slide3.xml><?xml version="1.0" encoding="utf-8"?>
+<p:sld xmlns:a="http://schemas.openxmlformats.org/drawingml/2006/main" xmlns:r="http://schemas.openxmlformats.org/officeDocument/2006/relationships" xmlns:p="http://schemas.openxmlformats.org/presentationml/2006/main">
+  <p:cSld>
+    <p:spTree>
+      <p:nvGrpSpPr>
+        <p:cNvPr id="1" name=""/>
+        <p:cNvGrpSpPr/>
+        <p:nvPr/>
+      </p:nvGrpSpPr>
+      <p:grpSpPr>
+        <a:xfrm>
+          <a:off x="0" y="0"/>
+          <a:ext cx="0" cy="0"/>
+          <a:chOff x="0" y="0"/>
+          <a:chExt cx="0" cy="0"/>
+        </a:xfrm>
+      </p:grpSpPr>
+      <p:pic>
+        <p:nvPicPr>
+          <p:cNvPr id="5" name="Imagem 4" descr="Uma imagem contendo mapa, texto&#10;&#10;Descrição gerada automaticamente">
+            <a:extLst>
+              <a:ext uri="{FF2B5EF4-FFF2-40B4-BE49-F238E27FC236}">
+                <a16:creationId xmlns:a16="http://schemas.microsoft.com/office/drawing/2014/main" id="{1422D68B-751A-4949-A0C4-F0BB50559AC9}"/>
+              </a:ext>
+            </a:extLst>
+          </p:cNvPr>
+          <p:cNvPicPr>
+            <a:picLocks noChangeAspect="1"/>
+          </p:cNvPicPr>
+          <p:nvPr/>
+        </p:nvPicPr>
+        <p:blipFill rotWithShape="1">
+          <a:blip r:embed="rId2">
+            <a:extLst>
+              <a:ext uri="{28A0092B-C50C-407E-A947-70E740481C1C}">
+                <a14:useLocalDpi xmlns:a14="http://schemas.microsoft.com/office/drawing/2010/main" val="0"/>
+              </a:ext>
+            </a:extLst>
+          </a:blip>
+          <a:srcRect l="3909" t="17589" r="745" b="5106"/>
+          <a:stretch/>
+        </p:blipFill>
+        <p:spPr>
+          <a:xfrm>
+            <a:off x="283722" y="885217"/>
+            <a:ext cx="11624555" cy="5301574"/>
+          </a:xfrm>
+          <a:prstGeom prst="rect">
+            <a:avLst/>
+          </a:prstGeom>
+        </p:spPr>
+      </p:pic>
+    </p:spTree>
+    <p:extLst>
+      <p:ext uri="{BB962C8B-B14F-4D97-AF65-F5344CB8AC3E}">
+        <p14:creationId xmlns:p14="http://schemas.microsoft.com/office/powerpoint/2010/main" val="3872970078"/>
+      </p:ext>
+    </p:extLst>
+  </p:cSld>
+  <p:clrMapOvr>
+    <a:masterClrMapping/>
+  </p:clrMapOvr>
+</p:sld>
+</file>
+
 <file path=ppt/theme/theme1.xml><?xml version="1.0" encoding="utf-8"?>
 <a:theme xmlns:a="http://schemas.openxmlformats.org/drawingml/2006/main" name="Tema do Office">
   <a:themeElements>

</xml_diff>

<commit_message>
adicionado procedimento de insercao de modelo 3D e mapa de col
</commit_message>
<xml_diff>
--- a/doc/pfc/Imagens/Imagens.pptx
+++ b/doc/pfc/Imagens/Imagens.pptx
@@ -8,6 +8,8 @@
     <p:sldId id="256" r:id="rId2"/>
     <p:sldId id="257" r:id="rId3"/>
     <p:sldId id="258" r:id="rId4"/>
+    <p:sldId id="259" r:id="rId5"/>
+    <p:sldId id="260" r:id="rId6"/>
   </p:sldIdLst>
   <p:sldSz cx="12192000" cy="6858000"/>
   <p:notesSz cx="6858000" cy="9144000"/>
@@ -3544,6 +3546,146 @@
 </p:sld>
 </file>
 
+<file path=ppt/slides/slide4.xml><?xml version="1.0" encoding="utf-8"?>
+<p:sld xmlns:a="http://schemas.openxmlformats.org/drawingml/2006/main" xmlns:r="http://schemas.openxmlformats.org/officeDocument/2006/relationships" xmlns:p="http://schemas.openxmlformats.org/presentationml/2006/main">
+  <p:cSld>
+    <p:spTree>
+      <p:nvGrpSpPr>
+        <p:cNvPr id="1" name=""/>
+        <p:cNvGrpSpPr/>
+        <p:nvPr/>
+      </p:nvGrpSpPr>
+      <p:grpSpPr>
+        <a:xfrm>
+          <a:off x="0" y="0"/>
+          <a:ext cx="0" cy="0"/>
+          <a:chOff x="0" y="0"/>
+          <a:chExt cx="0" cy="0"/>
+        </a:xfrm>
+      </p:grpSpPr>
+      <p:pic>
+        <p:nvPicPr>
+          <p:cNvPr id="5" name="Imagem 4" descr="Uma imagem contendo equipamentos eletrônicos, captura de tela, mostrador&#10;&#10;Descrição gerada automaticamente">
+            <a:extLst>
+              <a:ext uri="{FF2B5EF4-FFF2-40B4-BE49-F238E27FC236}">
+                <a16:creationId xmlns:a16="http://schemas.microsoft.com/office/drawing/2014/main" id="{EC7F8BB8-1C3C-46F8-AFC5-DECF1964847C}"/>
+              </a:ext>
+            </a:extLst>
+          </p:cNvPr>
+          <p:cNvPicPr>
+            <a:picLocks noChangeAspect="1"/>
+          </p:cNvPicPr>
+          <p:nvPr/>
+        </p:nvPicPr>
+        <p:blipFill>
+          <a:blip r:embed="rId2">
+            <a:extLst>
+              <a:ext uri="{28A0092B-C50C-407E-A947-70E740481C1C}">
+                <a14:useLocalDpi xmlns:a14="http://schemas.microsoft.com/office/drawing/2010/main" val="0"/>
+              </a:ext>
+            </a:extLst>
+          </a:blip>
+          <a:stretch>
+            <a:fillRect/>
+          </a:stretch>
+        </p:blipFill>
+        <p:spPr>
+          <a:xfrm>
+            <a:off x="0" y="0"/>
+            <a:ext cx="12192000" cy="6858000"/>
+          </a:xfrm>
+          <a:prstGeom prst="rect">
+            <a:avLst/>
+          </a:prstGeom>
+          <a:ln>
+            <a:noFill/>
+          </a:ln>
+          <a:effectLst>
+            <a:outerShdw blurRad="292100" dist="139700" dir="2700000" algn="tl" rotWithShape="0">
+              <a:srgbClr val="333333">
+                <a:alpha val="65000"/>
+              </a:srgbClr>
+            </a:outerShdw>
+          </a:effectLst>
+        </p:spPr>
+      </p:pic>
+    </p:spTree>
+    <p:extLst>
+      <p:ext uri="{BB962C8B-B14F-4D97-AF65-F5344CB8AC3E}">
+        <p14:creationId xmlns:p14="http://schemas.microsoft.com/office/powerpoint/2010/main" val="3426155952"/>
+      </p:ext>
+    </p:extLst>
+  </p:cSld>
+  <p:clrMapOvr>
+    <a:masterClrMapping/>
+  </p:clrMapOvr>
+</p:sld>
+</file>
+
+<file path=ppt/slides/slide5.xml><?xml version="1.0" encoding="utf-8"?>
+<p:sld xmlns:a="http://schemas.openxmlformats.org/drawingml/2006/main" xmlns:r="http://schemas.openxmlformats.org/officeDocument/2006/relationships" xmlns:p="http://schemas.openxmlformats.org/presentationml/2006/main">
+  <p:cSld>
+    <p:spTree>
+      <p:nvGrpSpPr>
+        <p:cNvPr id="1" name=""/>
+        <p:cNvGrpSpPr/>
+        <p:nvPr/>
+      </p:nvGrpSpPr>
+      <p:grpSpPr>
+        <a:xfrm>
+          <a:off x="0" y="0"/>
+          <a:ext cx="0" cy="0"/>
+          <a:chOff x="0" y="0"/>
+          <a:chExt cx="0" cy="0"/>
+        </a:xfrm>
+      </p:grpSpPr>
+      <p:pic>
+        <p:nvPicPr>
+          <p:cNvPr id="5" name="Espaço Reservado para Conteúdo 4" descr="Uma imagem contendo captura de tela&#10;&#10;Descrição gerada automaticamente">
+            <a:extLst>
+              <a:ext uri="{FF2B5EF4-FFF2-40B4-BE49-F238E27FC236}">
+                <a16:creationId xmlns:a16="http://schemas.microsoft.com/office/drawing/2014/main" id="{086892F1-BA6C-4A37-A51A-59F7605CF1F6}"/>
+              </a:ext>
+            </a:extLst>
+          </p:cNvPr>
+          <p:cNvPicPr>
+            <a:picLocks noGrp="1" noChangeAspect="1"/>
+          </p:cNvPicPr>
+          <p:nvPr>
+            <p:ph idx="1"/>
+          </p:nvPr>
+        </p:nvPicPr>
+        <p:blipFill rotWithShape="1">
+          <a:blip r:embed="rId2">
+            <a:extLst>
+              <a:ext uri="{28A0092B-C50C-407E-A947-70E740481C1C}">
+                <a14:useLocalDpi xmlns:a14="http://schemas.microsoft.com/office/drawing/2010/main" val="0"/>
+              </a:ext>
+            </a:extLst>
+          </a:blip>
+          <a:srcRect l="40692" t="16239" r="7524" b="16444"/>
+          <a:stretch/>
+        </p:blipFill>
+        <p:spPr>
+          <a:xfrm>
+            <a:off x="4893012" y="1556426"/>
+            <a:ext cx="5826869" cy="4260714"/>
+          </a:xfrm>
+        </p:spPr>
+      </p:pic>
+    </p:spTree>
+    <p:extLst>
+      <p:ext uri="{BB962C8B-B14F-4D97-AF65-F5344CB8AC3E}">
+        <p14:creationId xmlns:p14="http://schemas.microsoft.com/office/powerpoint/2010/main" val="2503151727"/>
+      </p:ext>
+    </p:extLst>
+  </p:cSld>
+  <p:clrMapOvr>
+    <a:masterClrMapping/>
+  </p:clrMapOvr>
+</p:sld>
+</file>
+
 <file path=ppt/theme/theme1.xml><?xml version="1.0" encoding="utf-8"?>
 <a:theme xmlns:a="http://schemas.openxmlformats.org/drawingml/2006/main" name="Tema do Office">
   <a:themeElements>

</xml_diff>

<commit_message>
adicionda secao de modulo executor de rotas
</commit_message>
<xml_diff>
--- a/doc/pfc/Imagens/Imagens.pptx
+++ b/doc/pfc/Imagens/Imagens.pptx
@@ -10,6 +10,10 @@
     <p:sldId id="258" r:id="rId4"/>
     <p:sldId id="259" r:id="rId5"/>
     <p:sldId id="260" r:id="rId6"/>
+    <p:sldId id="261" r:id="rId7"/>
+    <p:sldId id="262" r:id="rId8"/>
+    <p:sldId id="263" r:id="rId9"/>
+    <p:sldId id="264" r:id="rId10"/>
   </p:sldIdLst>
   <p:sldSz cx="12192000" cy="6858000"/>
   <p:notesSz cx="6858000" cy="9144000"/>
@@ -263,7 +267,7 @@
           <a:p>
             <a:fld id="{1B590A2A-F349-4206-8DF8-3C46CFD09084}" type="datetimeFigureOut">
               <a:rPr lang="pt-BR" smtClean="0"/>
-              <a:t>08/05/2019</a:t>
+              <a:t>11/05/2019</a:t>
             </a:fld>
             <a:endParaRPr lang="pt-BR"/>
           </a:p>
@@ -461,7 +465,7 @@
           <a:p>
             <a:fld id="{1B590A2A-F349-4206-8DF8-3C46CFD09084}" type="datetimeFigureOut">
               <a:rPr lang="pt-BR" smtClean="0"/>
-              <a:t>08/05/2019</a:t>
+              <a:t>11/05/2019</a:t>
             </a:fld>
             <a:endParaRPr lang="pt-BR"/>
           </a:p>
@@ -669,7 +673,7 @@
           <a:p>
             <a:fld id="{1B590A2A-F349-4206-8DF8-3C46CFD09084}" type="datetimeFigureOut">
               <a:rPr lang="pt-BR" smtClean="0"/>
-              <a:t>08/05/2019</a:t>
+              <a:t>11/05/2019</a:t>
             </a:fld>
             <a:endParaRPr lang="pt-BR"/>
           </a:p>
@@ -867,7 +871,7 @@
           <a:p>
             <a:fld id="{1B590A2A-F349-4206-8DF8-3C46CFD09084}" type="datetimeFigureOut">
               <a:rPr lang="pt-BR" smtClean="0"/>
-              <a:t>08/05/2019</a:t>
+              <a:t>11/05/2019</a:t>
             </a:fld>
             <a:endParaRPr lang="pt-BR"/>
           </a:p>
@@ -1142,7 +1146,7 @@
           <a:p>
             <a:fld id="{1B590A2A-F349-4206-8DF8-3C46CFD09084}" type="datetimeFigureOut">
               <a:rPr lang="pt-BR" smtClean="0"/>
-              <a:t>08/05/2019</a:t>
+              <a:t>11/05/2019</a:t>
             </a:fld>
             <a:endParaRPr lang="pt-BR"/>
           </a:p>
@@ -1407,7 +1411,7 @@
           <a:p>
             <a:fld id="{1B590A2A-F349-4206-8DF8-3C46CFD09084}" type="datetimeFigureOut">
               <a:rPr lang="pt-BR" smtClean="0"/>
-              <a:t>08/05/2019</a:t>
+              <a:t>11/05/2019</a:t>
             </a:fld>
             <a:endParaRPr lang="pt-BR"/>
           </a:p>
@@ -1819,7 +1823,7 @@
           <a:p>
             <a:fld id="{1B590A2A-F349-4206-8DF8-3C46CFD09084}" type="datetimeFigureOut">
               <a:rPr lang="pt-BR" smtClean="0"/>
-              <a:t>08/05/2019</a:t>
+              <a:t>11/05/2019</a:t>
             </a:fld>
             <a:endParaRPr lang="pt-BR"/>
           </a:p>
@@ -1960,7 +1964,7 @@
           <a:p>
             <a:fld id="{1B590A2A-F349-4206-8DF8-3C46CFD09084}" type="datetimeFigureOut">
               <a:rPr lang="pt-BR" smtClean="0"/>
-              <a:t>08/05/2019</a:t>
+              <a:t>11/05/2019</a:t>
             </a:fld>
             <a:endParaRPr lang="pt-BR"/>
           </a:p>
@@ -2073,7 +2077,7 @@
           <a:p>
             <a:fld id="{1B590A2A-F349-4206-8DF8-3C46CFD09084}" type="datetimeFigureOut">
               <a:rPr lang="pt-BR" smtClean="0"/>
-              <a:t>08/05/2019</a:t>
+              <a:t>11/05/2019</a:t>
             </a:fld>
             <a:endParaRPr lang="pt-BR"/>
           </a:p>
@@ -2384,7 +2388,7 @@
           <a:p>
             <a:fld id="{1B590A2A-F349-4206-8DF8-3C46CFD09084}" type="datetimeFigureOut">
               <a:rPr lang="pt-BR" smtClean="0"/>
-              <a:t>08/05/2019</a:t>
+              <a:t>11/05/2019</a:t>
             </a:fld>
             <a:endParaRPr lang="pt-BR"/>
           </a:p>
@@ -2672,7 +2676,7 @@
           <a:p>
             <a:fld id="{1B590A2A-F349-4206-8DF8-3C46CFD09084}" type="datetimeFigureOut">
               <a:rPr lang="pt-BR" smtClean="0"/>
-              <a:t>08/05/2019</a:t>
+              <a:t>11/05/2019</a:t>
             </a:fld>
             <a:endParaRPr lang="pt-BR"/>
           </a:p>
@@ -2913,7 +2917,7 @@
           <a:p>
             <a:fld id="{1B590A2A-F349-4206-8DF8-3C46CFD09084}" type="datetimeFigureOut">
               <a:rPr lang="pt-BR" smtClean="0"/>
-              <a:t>08/05/2019</a:t>
+              <a:t>11/05/2019</a:t>
             </a:fld>
             <a:endParaRPr lang="pt-BR"/>
           </a:p>
@@ -3686,6 +3690,3976 @@
 </p:sld>
 </file>
 
+<file path=ppt/slides/slide6.xml><?xml version="1.0" encoding="utf-8"?>
+<p:sld xmlns:a="http://schemas.openxmlformats.org/drawingml/2006/main" xmlns:r="http://schemas.openxmlformats.org/officeDocument/2006/relationships" xmlns:p="http://schemas.openxmlformats.org/presentationml/2006/main">
+  <p:cSld>
+    <p:spTree>
+      <p:nvGrpSpPr>
+        <p:cNvPr id="1" name=""/>
+        <p:cNvGrpSpPr/>
+        <p:nvPr/>
+      </p:nvGrpSpPr>
+      <p:grpSpPr>
+        <a:xfrm>
+          <a:off x="0" y="0"/>
+          <a:ext cx="0" cy="0"/>
+          <a:chOff x="0" y="0"/>
+          <a:chExt cx="0" cy="0"/>
+        </a:xfrm>
+      </p:grpSpPr>
+      <p:pic>
+        <p:nvPicPr>
+          <p:cNvPr id="1026" name="Picture 2" descr="Resultado de imagem para controle play 2 botoes">
+            <a:extLst>
+              <a:ext uri="{FF2B5EF4-FFF2-40B4-BE49-F238E27FC236}">
+                <a16:creationId xmlns:a16="http://schemas.microsoft.com/office/drawing/2014/main" id="{F3DAC3B8-9BDB-4381-A133-2E2CC290563C}"/>
+              </a:ext>
+            </a:extLst>
+          </p:cNvPr>
+          <p:cNvPicPr>
+            <a:picLocks noChangeAspect="1" noChangeArrowheads="1"/>
+          </p:cNvPicPr>
+          <p:nvPr/>
+        </p:nvPicPr>
+        <p:blipFill>
+          <a:blip r:embed="rId2">
+            <a:extLst>
+              <a:ext uri="{28A0092B-C50C-407E-A947-70E740481C1C}">
+                <a14:useLocalDpi xmlns:a14="http://schemas.microsoft.com/office/drawing/2010/main" val="0"/>
+              </a:ext>
+            </a:extLst>
+          </a:blip>
+          <a:srcRect/>
+          <a:stretch>
+            <a:fillRect/>
+          </a:stretch>
+        </p:blipFill>
+        <p:spPr bwMode="auto">
+          <a:xfrm>
+            <a:off x="3238500" y="1585913"/>
+            <a:ext cx="5715000" cy="3686175"/>
+          </a:xfrm>
+          <a:prstGeom prst="rect">
+            <a:avLst/>
+          </a:prstGeom>
+          <a:noFill/>
+          <a:extLst>
+            <a:ext uri="{909E8E84-426E-40DD-AFC4-6F175D3DCCD1}">
+              <a14:hiddenFill xmlns:a14="http://schemas.microsoft.com/office/drawing/2010/main">
+                <a:solidFill>
+                  <a:srgbClr val="FFFFFF"/>
+                </a:solidFill>
+              </a14:hiddenFill>
+            </a:ext>
+          </a:extLst>
+        </p:spPr>
+      </p:pic>
+      <p:cxnSp>
+        <p:nvCxnSpPr>
+          <p:cNvPr id="5" name="Conector de Seta Reta 4">
+            <a:extLst>
+              <a:ext uri="{FF2B5EF4-FFF2-40B4-BE49-F238E27FC236}">
+                <a16:creationId xmlns:a16="http://schemas.microsoft.com/office/drawing/2014/main" id="{E2690505-4906-453E-8988-255F0B1EA0E3}"/>
+              </a:ext>
+            </a:extLst>
+          </p:cNvPr>
+          <p:cNvCxnSpPr/>
+          <p:nvPr/>
+        </p:nvCxnSpPr>
+        <p:spPr>
+          <a:xfrm>
+            <a:off x="8342722" y="2941163"/>
+            <a:ext cx="1018094" cy="0"/>
+          </a:xfrm>
+          <a:prstGeom prst="straightConnector1">
+            <a:avLst/>
+          </a:prstGeom>
+          <a:ln w="38100">
+            <a:solidFill>
+              <a:schemeClr val="accent4"/>
+            </a:solidFill>
+            <a:tailEnd type="triangle"/>
+          </a:ln>
+        </p:spPr>
+        <p:style>
+          <a:lnRef idx="1">
+            <a:schemeClr val="accent1"/>
+          </a:lnRef>
+          <a:fillRef idx="0">
+            <a:schemeClr val="accent1"/>
+          </a:fillRef>
+          <a:effectRef idx="0">
+            <a:schemeClr val="accent1"/>
+          </a:effectRef>
+          <a:fontRef idx="minor">
+            <a:schemeClr val="tx1"/>
+          </a:fontRef>
+        </p:style>
+      </p:cxnSp>
+      <p:sp>
+        <p:nvSpPr>
+          <p:cNvPr id="6" name="CaixaDeTexto 5">
+            <a:extLst>
+              <a:ext uri="{FF2B5EF4-FFF2-40B4-BE49-F238E27FC236}">
+                <a16:creationId xmlns:a16="http://schemas.microsoft.com/office/drawing/2014/main" id="{4DDA6A9E-6ED2-4E8D-AC41-5C964B372773}"/>
+              </a:ext>
+            </a:extLst>
+          </p:cNvPr>
+          <p:cNvSpPr txBox="1"/>
+          <p:nvPr/>
+        </p:nvSpPr>
+        <p:spPr>
+          <a:xfrm>
+            <a:off x="9464511" y="2756497"/>
+            <a:ext cx="1583703" cy="369332"/>
+          </a:xfrm>
+          <a:prstGeom prst="rect">
+            <a:avLst/>
+          </a:prstGeom>
+          <a:noFill/>
+        </p:spPr>
+        <p:txBody>
+          <a:bodyPr wrap="square" rtlCol="0">
+            <a:spAutoFit/>
+          </a:bodyPr>
+          <a:lstStyle/>
+          <a:p>
+            <a:r>
+              <a:rPr lang="pt-BR" dirty="0"/>
+              <a:t>Modo manual</a:t>
+            </a:r>
+          </a:p>
+        </p:txBody>
+      </p:sp>
+      <p:sp>
+        <p:nvSpPr>
+          <p:cNvPr id="8" name="CaixaDeTexto 7">
+            <a:extLst>
+              <a:ext uri="{FF2B5EF4-FFF2-40B4-BE49-F238E27FC236}">
+                <a16:creationId xmlns:a16="http://schemas.microsoft.com/office/drawing/2014/main" id="{65CFE92C-84E3-4947-8E0C-08F2F6440FB5}"/>
+              </a:ext>
+            </a:extLst>
+          </p:cNvPr>
+          <p:cNvSpPr txBox="1"/>
+          <p:nvPr/>
+        </p:nvSpPr>
+        <p:spPr>
+          <a:xfrm>
+            <a:off x="1828801" y="2041630"/>
+            <a:ext cx="1690540" cy="369332"/>
+          </a:xfrm>
+          <a:prstGeom prst="rect">
+            <a:avLst/>
+          </a:prstGeom>
+          <a:noFill/>
+        </p:spPr>
+        <p:txBody>
+          <a:bodyPr wrap="square" rtlCol="0">
+            <a:spAutoFit/>
+          </a:bodyPr>
+          <a:lstStyle/>
+          <a:p>
+            <a:r>
+              <a:rPr lang="pt-BR" dirty="0"/>
+              <a:t>Aumentar nível</a:t>
+            </a:r>
+          </a:p>
+        </p:txBody>
+      </p:sp>
+      <p:cxnSp>
+        <p:nvCxnSpPr>
+          <p:cNvPr id="9" name="Conector: Angulado 8">
+            <a:extLst>
+              <a:ext uri="{FF2B5EF4-FFF2-40B4-BE49-F238E27FC236}">
+                <a16:creationId xmlns:a16="http://schemas.microsoft.com/office/drawing/2014/main" id="{741521AA-FE1A-404D-B0AF-7EBA9EF2BFC2}"/>
+              </a:ext>
+            </a:extLst>
+          </p:cNvPr>
+          <p:cNvCxnSpPr>
+            <a:cxnSpLocks/>
+            <a:endCxn id="8" idx="3"/>
+          </p:cNvCxnSpPr>
+          <p:nvPr/>
+        </p:nvCxnSpPr>
+        <p:spPr>
+          <a:xfrm rot="10800000">
+            <a:off x="3519342" y="2226297"/>
+            <a:ext cx="882981" cy="366083"/>
+          </a:xfrm>
+          <a:prstGeom prst="bentConnector3">
+            <a:avLst/>
+          </a:prstGeom>
+          <a:ln w="38100">
+            <a:solidFill>
+              <a:srgbClr val="00B050"/>
+            </a:solidFill>
+            <a:tailEnd type="triangle"/>
+          </a:ln>
+        </p:spPr>
+        <p:style>
+          <a:lnRef idx="1">
+            <a:schemeClr val="accent1"/>
+          </a:lnRef>
+          <a:fillRef idx="0">
+            <a:schemeClr val="accent1"/>
+          </a:fillRef>
+          <a:effectRef idx="0">
+            <a:schemeClr val="accent1"/>
+          </a:effectRef>
+          <a:fontRef idx="minor">
+            <a:schemeClr val="tx1"/>
+          </a:fontRef>
+        </p:style>
+      </p:cxnSp>
+      <p:sp>
+        <p:nvSpPr>
+          <p:cNvPr id="11" name="CaixaDeTexto 10">
+            <a:extLst>
+              <a:ext uri="{FF2B5EF4-FFF2-40B4-BE49-F238E27FC236}">
+                <a16:creationId xmlns:a16="http://schemas.microsoft.com/office/drawing/2014/main" id="{EE082000-7584-4E86-8AB0-24513F4E54D9}"/>
+              </a:ext>
+            </a:extLst>
+          </p:cNvPr>
+          <p:cNvSpPr txBox="1"/>
+          <p:nvPr/>
+        </p:nvSpPr>
+        <p:spPr>
+          <a:xfrm>
+            <a:off x="1946242" y="3378232"/>
+            <a:ext cx="1583703" cy="369332"/>
+          </a:xfrm>
+          <a:prstGeom prst="rect">
+            <a:avLst/>
+          </a:prstGeom>
+          <a:noFill/>
+        </p:spPr>
+        <p:txBody>
+          <a:bodyPr wrap="square" rtlCol="0">
+            <a:spAutoFit/>
+          </a:bodyPr>
+          <a:lstStyle/>
+          <a:p>
+            <a:r>
+              <a:rPr lang="pt-BR" dirty="0"/>
+              <a:t>Diminuir nível</a:t>
+            </a:r>
+          </a:p>
+        </p:txBody>
+      </p:sp>
+      <p:cxnSp>
+        <p:nvCxnSpPr>
+          <p:cNvPr id="12" name="Conector: Angulado 11">
+            <a:extLst>
+              <a:ext uri="{FF2B5EF4-FFF2-40B4-BE49-F238E27FC236}">
+                <a16:creationId xmlns:a16="http://schemas.microsoft.com/office/drawing/2014/main" id="{CFC365FD-7357-4870-ACC5-A045B08A7B74}"/>
+              </a:ext>
+            </a:extLst>
+          </p:cNvPr>
+          <p:cNvCxnSpPr>
+            <a:cxnSpLocks/>
+            <a:endCxn id="11" idx="3"/>
+          </p:cNvCxnSpPr>
+          <p:nvPr/>
+        </p:nvCxnSpPr>
+        <p:spPr>
+          <a:xfrm rot="10800000" flipV="1">
+            <a:off x="3529946" y="3232756"/>
+            <a:ext cx="872373" cy="330141"/>
+          </a:xfrm>
+          <a:prstGeom prst="bentConnector3">
+            <a:avLst>
+              <a:gd name="adj1" fmla="val 41356"/>
+            </a:avLst>
+          </a:prstGeom>
+          <a:ln w="38100">
+            <a:solidFill>
+              <a:srgbClr val="00B050"/>
+            </a:solidFill>
+            <a:tailEnd type="triangle"/>
+          </a:ln>
+        </p:spPr>
+        <p:style>
+          <a:lnRef idx="1">
+            <a:schemeClr val="accent1"/>
+          </a:lnRef>
+          <a:fillRef idx="0">
+            <a:schemeClr val="accent1"/>
+          </a:fillRef>
+          <a:effectRef idx="0">
+            <a:schemeClr val="accent1"/>
+          </a:effectRef>
+          <a:fontRef idx="minor">
+            <a:schemeClr val="tx1"/>
+          </a:fontRef>
+        </p:style>
+      </p:cxnSp>
+      <p:sp>
+        <p:nvSpPr>
+          <p:cNvPr id="17" name="CaixaDeTexto 16">
+            <a:extLst>
+              <a:ext uri="{FF2B5EF4-FFF2-40B4-BE49-F238E27FC236}">
+                <a16:creationId xmlns:a16="http://schemas.microsoft.com/office/drawing/2014/main" id="{BD353A44-7150-4888-B03B-8E22B87C3B11}"/>
+              </a:ext>
+            </a:extLst>
+          </p:cNvPr>
+          <p:cNvSpPr txBox="1"/>
+          <p:nvPr/>
+        </p:nvSpPr>
+        <p:spPr>
+          <a:xfrm>
+            <a:off x="3691476" y="375762"/>
+            <a:ext cx="1583703" cy="369332"/>
+          </a:xfrm>
+          <a:prstGeom prst="rect">
+            <a:avLst/>
+          </a:prstGeom>
+          <a:noFill/>
+        </p:spPr>
+        <p:txBody>
+          <a:bodyPr wrap="square" rtlCol="0">
+            <a:spAutoFit/>
+          </a:bodyPr>
+          <a:lstStyle/>
+          <a:p>
+            <a:r>
+              <a:rPr lang="pt-BR" dirty="0"/>
+              <a:t>Coletar pontos</a:t>
+            </a:r>
+          </a:p>
+        </p:txBody>
+      </p:sp>
+      <p:sp>
+        <p:nvSpPr>
+          <p:cNvPr id="20" name="CaixaDeTexto 19">
+            <a:extLst>
+              <a:ext uri="{FF2B5EF4-FFF2-40B4-BE49-F238E27FC236}">
+                <a16:creationId xmlns:a16="http://schemas.microsoft.com/office/drawing/2014/main" id="{81DF7313-3182-45DC-BA72-CEA81E4845C5}"/>
+              </a:ext>
+            </a:extLst>
+          </p:cNvPr>
+          <p:cNvSpPr txBox="1"/>
+          <p:nvPr/>
+        </p:nvSpPr>
+        <p:spPr>
+          <a:xfrm>
+            <a:off x="6235642" y="375762"/>
+            <a:ext cx="2946066" cy="369332"/>
+          </a:xfrm>
+          <a:prstGeom prst="rect">
+            <a:avLst/>
+          </a:prstGeom>
+          <a:noFill/>
+        </p:spPr>
+        <p:txBody>
+          <a:bodyPr wrap="square" rtlCol="0">
+            <a:spAutoFit/>
+          </a:bodyPr>
+          <a:lstStyle/>
+          <a:p>
+            <a:r>
+              <a:rPr lang="pt-BR" dirty="0"/>
+              <a:t>Armazenar pontos coletados</a:t>
+            </a:r>
+          </a:p>
+        </p:txBody>
+      </p:sp>
+      <p:cxnSp>
+        <p:nvCxnSpPr>
+          <p:cNvPr id="27" name="Conector: Angulado 26">
+            <a:extLst>
+              <a:ext uri="{FF2B5EF4-FFF2-40B4-BE49-F238E27FC236}">
+                <a16:creationId xmlns:a16="http://schemas.microsoft.com/office/drawing/2014/main" id="{CB74026F-60F9-4DD4-A0EA-DDA603901A7C}"/>
+              </a:ext>
+            </a:extLst>
+          </p:cNvPr>
+          <p:cNvCxnSpPr>
+            <a:cxnSpLocks/>
+          </p:cNvCxnSpPr>
+          <p:nvPr/>
+        </p:nvCxnSpPr>
+        <p:spPr>
+          <a:xfrm rot="16200000" flipV="1">
+            <a:off x="3905340" y="1275948"/>
+            <a:ext cx="2196069" cy="1134362"/>
+          </a:xfrm>
+          <a:prstGeom prst="bentConnector3">
+            <a:avLst>
+              <a:gd name="adj1" fmla="val 89921"/>
+            </a:avLst>
+          </a:prstGeom>
+          <a:ln w="38100">
+            <a:solidFill>
+              <a:srgbClr val="00B050"/>
+            </a:solidFill>
+            <a:tailEnd type="triangle"/>
+          </a:ln>
+        </p:spPr>
+        <p:style>
+          <a:lnRef idx="1">
+            <a:schemeClr val="accent1"/>
+          </a:lnRef>
+          <a:fillRef idx="0">
+            <a:schemeClr val="accent1"/>
+          </a:fillRef>
+          <a:effectRef idx="0">
+            <a:schemeClr val="accent1"/>
+          </a:effectRef>
+          <a:fontRef idx="minor">
+            <a:schemeClr val="tx1"/>
+          </a:fontRef>
+        </p:style>
+      </p:cxnSp>
+      <p:cxnSp>
+        <p:nvCxnSpPr>
+          <p:cNvPr id="32" name="Conector: Angulado 31">
+            <a:extLst>
+              <a:ext uri="{FF2B5EF4-FFF2-40B4-BE49-F238E27FC236}">
+                <a16:creationId xmlns:a16="http://schemas.microsoft.com/office/drawing/2014/main" id="{7149C8A8-DE68-44A9-A7BE-15F7EA148C1A}"/>
+              </a:ext>
+            </a:extLst>
+          </p:cNvPr>
+          <p:cNvCxnSpPr>
+            <a:cxnSpLocks/>
+            <a:endCxn id="20" idx="2"/>
+          </p:cNvCxnSpPr>
+          <p:nvPr/>
+        </p:nvCxnSpPr>
+        <p:spPr>
+          <a:xfrm rot="5400000" flipH="1" flipV="1">
+            <a:off x="6065302" y="1297801"/>
+            <a:ext cx="2196079" cy="1090667"/>
+          </a:xfrm>
+          <a:prstGeom prst="bentConnector3">
+            <a:avLst>
+              <a:gd name="adj1" fmla="val 90350"/>
+            </a:avLst>
+          </a:prstGeom>
+          <a:ln w="38100">
+            <a:solidFill>
+              <a:srgbClr val="00B050"/>
+            </a:solidFill>
+            <a:tailEnd type="triangle"/>
+          </a:ln>
+        </p:spPr>
+        <p:style>
+          <a:lnRef idx="1">
+            <a:schemeClr val="accent1"/>
+          </a:lnRef>
+          <a:fillRef idx="0">
+            <a:schemeClr val="accent1"/>
+          </a:fillRef>
+          <a:effectRef idx="0">
+            <a:schemeClr val="accent1"/>
+          </a:effectRef>
+          <a:fontRef idx="minor">
+            <a:schemeClr val="tx1"/>
+          </a:fontRef>
+        </p:style>
+      </p:cxnSp>
+      <p:cxnSp>
+        <p:nvCxnSpPr>
+          <p:cNvPr id="41" name="Conector: Angulado 40">
+            <a:extLst>
+              <a:ext uri="{FF2B5EF4-FFF2-40B4-BE49-F238E27FC236}">
+                <a16:creationId xmlns:a16="http://schemas.microsoft.com/office/drawing/2014/main" id="{00C9C943-1A91-4BDB-A0C2-5FF09463EF2C}"/>
+              </a:ext>
+            </a:extLst>
+          </p:cNvPr>
+          <p:cNvCxnSpPr/>
+          <p:nvPr/>
+        </p:nvCxnSpPr>
+        <p:spPr>
+          <a:xfrm rot="10800000">
+            <a:off x="2562025" y="1284025"/>
+            <a:ext cx="1819374" cy="424207"/>
+          </a:xfrm>
+          <a:prstGeom prst="bentConnector3">
+            <a:avLst>
+              <a:gd name="adj1" fmla="val -3886"/>
+            </a:avLst>
+          </a:prstGeom>
+          <a:ln w="38100">
+            <a:solidFill>
+              <a:schemeClr val="accent4"/>
+            </a:solidFill>
+            <a:tailEnd type="triangle"/>
+          </a:ln>
+        </p:spPr>
+        <p:style>
+          <a:lnRef idx="1">
+            <a:schemeClr val="accent1"/>
+          </a:lnRef>
+          <a:fillRef idx="0">
+            <a:schemeClr val="accent1"/>
+          </a:fillRef>
+          <a:effectRef idx="0">
+            <a:schemeClr val="accent1"/>
+          </a:effectRef>
+          <a:fontRef idx="minor">
+            <a:schemeClr val="tx1"/>
+          </a:fontRef>
+        </p:style>
+      </p:cxnSp>
+      <p:cxnSp>
+        <p:nvCxnSpPr>
+          <p:cNvPr id="44" name="Conector: Angulado 43">
+            <a:extLst>
+              <a:ext uri="{FF2B5EF4-FFF2-40B4-BE49-F238E27FC236}">
+                <a16:creationId xmlns:a16="http://schemas.microsoft.com/office/drawing/2014/main" id="{35AF7291-A312-4B01-A061-A1CA705D929B}"/>
+              </a:ext>
+            </a:extLst>
+          </p:cNvPr>
+          <p:cNvCxnSpPr>
+            <a:cxnSpLocks/>
+          </p:cNvCxnSpPr>
+          <p:nvPr/>
+        </p:nvCxnSpPr>
+        <p:spPr>
+          <a:xfrm flipV="1">
+            <a:off x="7772180" y="1284024"/>
+            <a:ext cx="1857795" cy="431102"/>
+          </a:xfrm>
+          <a:prstGeom prst="bentConnector3">
+            <a:avLst>
+              <a:gd name="adj1" fmla="val 273"/>
+            </a:avLst>
+          </a:prstGeom>
+          <a:ln w="38100">
+            <a:solidFill>
+              <a:srgbClr val="00B050"/>
+            </a:solidFill>
+            <a:tailEnd type="triangle"/>
+          </a:ln>
+        </p:spPr>
+        <p:style>
+          <a:lnRef idx="1">
+            <a:schemeClr val="accent1"/>
+          </a:lnRef>
+          <a:fillRef idx="0">
+            <a:schemeClr val="accent1"/>
+          </a:fillRef>
+          <a:effectRef idx="0">
+            <a:schemeClr val="accent1"/>
+          </a:effectRef>
+          <a:fontRef idx="minor">
+            <a:schemeClr val="tx1"/>
+          </a:fontRef>
+        </p:style>
+      </p:cxnSp>
+      <p:sp>
+        <p:nvSpPr>
+          <p:cNvPr id="54" name="CaixaDeTexto 53">
+            <a:extLst>
+              <a:ext uri="{FF2B5EF4-FFF2-40B4-BE49-F238E27FC236}">
+                <a16:creationId xmlns:a16="http://schemas.microsoft.com/office/drawing/2014/main" id="{134D5FE6-C787-4F4E-AFE3-C0266C398986}"/>
+              </a:ext>
+            </a:extLst>
+          </p:cNvPr>
+          <p:cNvSpPr txBox="1"/>
+          <p:nvPr/>
+        </p:nvSpPr>
+        <p:spPr>
+          <a:xfrm>
+            <a:off x="9693480" y="1099358"/>
+            <a:ext cx="1948623" cy="369333"/>
+          </a:xfrm>
+          <a:prstGeom prst="rect">
+            <a:avLst/>
+          </a:prstGeom>
+          <a:noFill/>
+        </p:spPr>
+        <p:txBody>
+          <a:bodyPr wrap="square" rtlCol="0">
+            <a:spAutoFit/>
+          </a:bodyPr>
+          <a:lstStyle/>
+          <a:p>
+            <a:r>
+              <a:rPr lang="pt-BR" dirty="0"/>
+              <a:t>R2 – Zerar pontos</a:t>
+            </a:r>
+          </a:p>
+        </p:txBody>
+      </p:sp>
+      <p:sp>
+        <p:nvSpPr>
+          <p:cNvPr id="55" name="CaixaDeTexto 54">
+            <a:extLst>
+              <a:ext uri="{FF2B5EF4-FFF2-40B4-BE49-F238E27FC236}">
+                <a16:creationId xmlns:a16="http://schemas.microsoft.com/office/drawing/2014/main" id="{25B1EEF8-BD05-43AA-BBF9-25E16F77B4F1}"/>
+              </a:ext>
+            </a:extLst>
+          </p:cNvPr>
+          <p:cNvSpPr txBox="1"/>
+          <p:nvPr/>
+        </p:nvSpPr>
+        <p:spPr>
+          <a:xfrm>
+            <a:off x="320512" y="1074360"/>
+            <a:ext cx="2249466" cy="369332"/>
+          </a:xfrm>
+          <a:prstGeom prst="rect">
+            <a:avLst/>
+          </a:prstGeom>
+          <a:noFill/>
+        </p:spPr>
+        <p:txBody>
+          <a:bodyPr wrap="square" rtlCol="0">
+            <a:spAutoFit/>
+          </a:bodyPr>
+          <a:lstStyle/>
+          <a:p>
+            <a:r>
+              <a:rPr lang="pt-BR" dirty="0"/>
+              <a:t>L2 – Modo autônomo</a:t>
+            </a:r>
+          </a:p>
+        </p:txBody>
+      </p:sp>
+      <p:cxnSp>
+        <p:nvCxnSpPr>
+          <p:cNvPr id="58" name="Conector de Seta Reta 57">
+            <a:extLst>
+              <a:ext uri="{FF2B5EF4-FFF2-40B4-BE49-F238E27FC236}">
+                <a16:creationId xmlns:a16="http://schemas.microsoft.com/office/drawing/2014/main" id="{DC0CD190-5D0E-4A63-BFD7-363812A15EB5}"/>
+              </a:ext>
+            </a:extLst>
+          </p:cNvPr>
+          <p:cNvCxnSpPr/>
+          <p:nvPr/>
+        </p:nvCxnSpPr>
+        <p:spPr>
+          <a:xfrm>
+            <a:off x="5209191" y="3747564"/>
+            <a:ext cx="0" cy="1276923"/>
+          </a:xfrm>
+          <a:prstGeom prst="straightConnector1">
+            <a:avLst/>
+          </a:prstGeom>
+          <a:ln w="38100">
+            <a:solidFill>
+              <a:schemeClr val="accent4"/>
+            </a:solidFill>
+            <a:tailEnd type="triangle"/>
+          </a:ln>
+        </p:spPr>
+        <p:style>
+          <a:lnRef idx="1">
+            <a:schemeClr val="accent1"/>
+          </a:lnRef>
+          <a:fillRef idx="0">
+            <a:schemeClr val="accent1"/>
+          </a:fillRef>
+          <a:effectRef idx="0">
+            <a:schemeClr val="accent1"/>
+          </a:effectRef>
+          <a:fontRef idx="minor">
+            <a:schemeClr val="tx1"/>
+          </a:fontRef>
+        </p:style>
+      </p:cxnSp>
+      <p:cxnSp>
+        <p:nvCxnSpPr>
+          <p:cNvPr id="60" name="Conector de Seta Reta 59">
+            <a:extLst>
+              <a:ext uri="{FF2B5EF4-FFF2-40B4-BE49-F238E27FC236}">
+                <a16:creationId xmlns:a16="http://schemas.microsoft.com/office/drawing/2014/main" id="{762544C2-A4F9-4D62-96D7-C1BD1B091D06}"/>
+              </a:ext>
+            </a:extLst>
+          </p:cNvPr>
+          <p:cNvCxnSpPr/>
+          <p:nvPr/>
+        </p:nvCxnSpPr>
+        <p:spPr>
+          <a:xfrm>
+            <a:off x="6916823" y="3747564"/>
+            <a:ext cx="0" cy="1276923"/>
+          </a:xfrm>
+          <a:prstGeom prst="straightConnector1">
+            <a:avLst/>
+          </a:prstGeom>
+          <a:ln w="38100">
+            <a:solidFill>
+              <a:schemeClr val="accent4"/>
+            </a:solidFill>
+            <a:tailEnd type="triangle"/>
+          </a:ln>
+        </p:spPr>
+        <p:style>
+          <a:lnRef idx="1">
+            <a:schemeClr val="accent1"/>
+          </a:lnRef>
+          <a:fillRef idx="0">
+            <a:schemeClr val="accent1"/>
+          </a:fillRef>
+          <a:effectRef idx="0">
+            <a:schemeClr val="accent1"/>
+          </a:effectRef>
+          <a:fontRef idx="minor">
+            <a:schemeClr val="tx1"/>
+          </a:fontRef>
+        </p:style>
+      </p:cxnSp>
+      <p:cxnSp>
+        <p:nvCxnSpPr>
+          <p:cNvPr id="61" name="Conector de Seta Reta 60">
+            <a:extLst>
+              <a:ext uri="{FF2B5EF4-FFF2-40B4-BE49-F238E27FC236}">
+                <a16:creationId xmlns:a16="http://schemas.microsoft.com/office/drawing/2014/main" id="{E568357E-BF40-4C8C-A2F1-C609A632ED04}"/>
+              </a:ext>
+            </a:extLst>
+          </p:cNvPr>
+          <p:cNvCxnSpPr/>
+          <p:nvPr/>
+        </p:nvCxnSpPr>
+        <p:spPr>
+          <a:xfrm>
+            <a:off x="4660034" y="6014301"/>
+            <a:ext cx="1175158" cy="0"/>
+          </a:xfrm>
+          <a:prstGeom prst="straightConnector1">
+            <a:avLst/>
+          </a:prstGeom>
+          <a:ln w="38100">
+            <a:solidFill>
+              <a:schemeClr val="accent4"/>
+            </a:solidFill>
+            <a:headEnd type="triangle"/>
+            <a:tailEnd type="triangle"/>
+          </a:ln>
+        </p:spPr>
+        <p:style>
+          <a:lnRef idx="1">
+            <a:schemeClr val="accent1"/>
+          </a:lnRef>
+          <a:fillRef idx="0">
+            <a:schemeClr val="accent1"/>
+          </a:fillRef>
+          <a:effectRef idx="0">
+            <a:schemeClr val="accent1"/>
+          </a:effectRef>
+          <a:fontRef idx="minor">
+            <a:schemeClr val="tx1"/>
+          </a:fontRef>
+        </p:style>
+      </p:cxnSp>
+      <p:cxnSp>
+        <p:nvCxnSpPr>
+          <p:cNvPr id="63" name="Conector de Seta Reta 62">
+            <a:extLst>
+              <a:ext uri="{FF2B5EF4-FFF2-40B4-BE49-F238E27FC236}">
+                <a16:creationId xmlns:a16="http://schemas.microsoft.com/office/drawing/2014/main" id="{5BEDB26B-0DEA-4344-B2EF-A963D40FBD91}"/>
+              </a:ext>
+            </a:extLst>
+          </p:cNvPr>
+          <p:cNvCxnSpPr>
+            <a:cxnSpLocks/>
+          </p:cNvCxnSpPr>
+          <p:nvPr/>
+        </p:nvCxnSpPr>
+        <p:spPr>
+          <a:xfrm>
+            <a:off x="5247613" y="5512557"/>
+            <a:ext cx="0" cy="1003487"/>
+          </a:xfrm>
+          <a:prstGeom prst="straightConnector1">
+            <a:avLst/>
+          </a:prstGeom>
+          <a:ln w="38100">
+            <a:solidFill>
+              <a:schemeClr val="accent4"/>
+            </a:solidFill>
+            <a:headEnd type="triangle"/>
+            <a:tailEnd type="triangle"/>
+          </a:ln>
+        </p:spPr>
+        <p:style>
+          <a:lnRef idx="1">
+            <a:schemeClr val="accent1"/>
+          </a:lnRef>
+          <a:fillRef idx="0">
+            <a:schemeClr val="accent1"/>
+          </a:fillRef>
+          <a:effectRef idx="0">
+            <a:schemeClr val="accent1"/>
+          </a:effectRef>
+          <a:fontRef idx="minor">
+            <a:schemeClr val="tx1"/>
+          </a:fontRef>
+        </p:style>
+      </p:cxnSp>
+      <p:cxnSp>
+        <p:nvCxnSpPr>
+          <p:cNvPr id="66" name="Conector de Seta Reta 65">
+            <a:extLst>
+              <a:ext uri="{FF2B5EF4-FFF2-40B4-BE49-F238E27FC236}">
+                <a16:creationId xmlns:a16="http://schemas.microsoft.com/office/drawing/2014/main" id="{ED4E2DBD-F6FB-4D49-B3A5-1014C15DC229}"/>
+              </a:ext>
+            </a:extLst>
+          </p:cNvPr>
+          <p:cNvCxnSpPr/>
+          <p:nvPr/>
+        </p:nvCxnSpPr>
+        <p:spPr>
+          <a:xfrm>
+            <a:off x="6329244" y="6014300"/>
+            <a:ext cx="1175158" cy="0"/>
+          </a:xfrm>
+          <a:prstGeom prst="straightConnector1">
+            <a:avLst/>
+          </a:prstGeom>
+          <a:ln w="38100">
+            <a:solidFill>
+              <a:schemeClr val="accent4"/>
+            </a:solidFill>
+            <a:headEnd type="triangle"/>
+            <a:tailEnd type="triangle"/>
+          </a:ln>
+        </p:spPr>
+        <p:style>
+          <a:lnRef idx="1">
+            <a:schemeClr val="accent1"/>
+          </a:lnRef>
+          <a:fillRef idx="0">
+            <a:schemeClr val="accent1"/>
+          </a:fillRef>
+          <a:effectRef idx="0">
+            <a:schemeClr val="accent1"/>
+          </a:effectRef>
+          <a:fontRef idx="minor">
+            <a:schemeClr val="tx1"/>
+          </a:fontRef>
+        </p:style>
+      </p:cxnSp>
+      <p:cxnSp>
+        <p:nvCxnSpPr>
+          <p:cNvPr id="67" name="Conector de Seta Reta 66">
+            <a:extLst>
+              <a:ext uri="{FF2B5EF4-FFF2-40B4-BE49-F238E27FC236}">
+                <a16:creationId xmlns:a16="http://schemas.microsoft.com/office/drawing/2014/main" id="{C426112A-9C1F-4247-93E1-D4BA2CAF389F}"/>
+              </a:ext>
+            </a:extLst>
+          </p:cNvPr>
+          <p:cNvCxnSpPr>
+            <a:cxnSpLocks/>
+          </p:cNvCxnSpPr>
+          <p:nvPr/>
+        </p:nvCxnSpPr>
+        <p:spPr>
+          <a:xfrm>
+            <a:off x="6916823" y="5512556"/>
+            <a:ext cx="0" cy="1003487"/>
+          </a:xfrm>
+          <a:prstGeom prst="straightConnector1">
+            <a:avLst/>
+          </a:prstGeom>
+          <a:ln w="38100">
+            <a:solidFill>
+              <a:schemeClr val="accent4"/>
+            </a:solidFill>
+            <a:headEnd type="triangle"/>
+            <a:tailEnd type="triangle"/>
+          </a:ln>
+        </p:spPr>
+        <p:style>
+          <a:lnRef idx="1">
+            <a:schemeClr val="accent1"/>
+          </a:lnRef>
+          <a:fillRef idx="0">
+            <a:schemeClr val="accent1"/>
+          </a:fillRef>
+          <a:effectRef idx="0">
+            <a:schemeClr val="accent1"/>
+          </a:effectRef>
+          <a:fontRef idx="minor">
+            <a:schemeClr val="tx1"/>
+          </a:fontRef>
+        </p:style>
+      </p:cxnSp>
+      <p:sp>
+        <p:nvSpPr>
+          <p:cNvPr id="1025" name="CaixaDeTexto 1024">
+            <a:extLst>
+              <a:ext uri="{FF2B5EF4-FFF2-40B4-BE49-F238E27FC236}">
+                <a16:creationId xmlns:a16="http://schemas.microsoft.com/office/drawing/2014/main" id="{D2B1C8AE-A42F-46A1-AD72-8EE0FD910925}"/>
+              </a:ext>
+            </a:extLst>
+          </p:cNvPr>
+          <p:cNvSpPr txBox="1"/>
+          <p:nvPr/>
+        </p:nvSpPr>
+        <p:spPr>
+          <a:xfrm>
+            <a:off x="7504401" y="5829633"/>
+            <a:ext cx="587567" cy="369332"/>
+          </a:xfrm>
+          <a:prstGeom prst="rect">
+            <a:avLst/>
+          </a:prstGeom>
+          <a:noFill/>
+        </p:spPr>
+        <p:txBody>
+          <a:bodyPr wrap="square" rtlCol="0">
+            <a:spAutoFit/>
+          </a:bodyPr>
+          <a:lstStyle/>
+          <a:p>
+            <a:r>
+              <a:rPr lang="pt-BR" dirty="0"/>
+              <a:t>Yaw</a:t>
+            </a:r>
+          </a:p>
+        </p:txBody>
+      </p:sp>
+      <p:sp>
+        <p:nvSpPr>
+          <p:cNvPr id="69" name="CaixaDeTexto 68">
+            <a:extLst>
+              <a:ext uri="{FF2B5EF4-FFF2-40B4-BE49-F238E27FC236}">
+                <a16:creationId xmlns:a16="http://schemas.microsoft.com/office/drawing/2014/main" id="{823BAB4C-A745-4FCA-916E-65EF6A114C28}"/>
+              </a:ext>
+            </a:extLst>
+          </p:cNvPr>
+          <p:cNvSpPr txBox="1"/>
+          <p:nvPr/>
+        </p:nvSpPr>
+        <p:spPr>
+          <a:xfrm>
+            <a:off x="6523251" y="6503213"/>
+            <a:ext cx="787144" cy="369332"/>
+          </a:xfrm>
+          <a:prstGeom prst="rect">
+            <a:avLst/>
+          </a:prstGeom>
+          <a:noFill/>
+        </p:spPr>
+        <p:txBody>
+          <a:bodyPr wrap="square" rtlCol="0">
+            <a:spAutoFit/>
+          </a:bodyPr>
+          <a:lstStyle/>
+          <a:p>
+            <a:r>
+              <a:rPr lang="pt-BR" dirty="0" err="1"/>
+              <a:t>Thrust</a:t>
+            </a:r>
+            <a:endParaRPr lang="pt-BR" dirty="0"/>
+          </a:p>
+        </p:txBody>
+      </p:sp>
+      <p:sp>
+        <p:nvSpPr>
+          <p:cNvPr id="70" name="CaixaDeTexto 69">
+            <a:extLst>
+              <a:ext uri="{FF2B5EF4-FFF2-40B4-BE49-F238E27FC236}">
+                <a16:creationId xmlns:a16="http://schemas.microsoft.com/office/drawing/2014/main" id="{81F562AB-C059-403A-B524-5935E80FC181}"/>
+              </a:ext>
+            </a:extLst>
+          </p:cNvPr>
+          <p:cNvSpPr txBox="1"/>
+          <p:nvPr/>
+        </p:nvSpPr>
+        <p:spPr>
+          <a:xfrm>
+            <a:off x="4088157" y="5823987"/>
+            <a:ext cx="608287" cy="369332"/>
+          </a:xfrm>
+          <a:prstGeom prst="rect">
+            <a:avLst/>
+          </a:prstGeom>
+          <a:noFill/>
+        </p:spPr>
+        <p:txBody>
+          <a:bodyPr wrap="square" rtlCol="0">
+            <a:spAutoFit/>
+          </a:bodyPr>
+          <a:lstStyle/>
+          <a:p>
+            <a:r>
+              <a:rPr lang="pt-BR" dirty="0"/>
+              <a:t>Roll</a:t>
+            </a:r>
+          </a:p>
+        </p:txBody>
+      </p:sp>
+      <p:sp>
+        <p:nvSpPr>
+          <p:cNvPr id="71" name="CaixaDeTexto 70">
+            <a:extLst>
+              <a:ext uri="{FF2B5EF4-FFF2-40B4-BE49-F238E27FC236}">
+                <a16:creationId xmlns:a16="http://schemas.microsoft.com/office/drawing/2014/main" id="{EAC659BB-4F3A-4B92-84D4-A9CDCEEE1F0F}"/>
+              </a:ext>
+            </a:extLst>
+          </p:cNvPr>
+          <p:cNvSpPr txBox="1"/>
+          <p:nvPr/>
+        </p:nvSpPr>
+        <p:spPr>
+          <a:xfrm>
+            <a:off x="4944988" y="6521692"/>
+            <a:ext cx="890196" cy="369332"/>
+          </a:xfrm>
+          <a:prstGeom prst="rect">
+            <a:avLst/>
+          </a:prstGeom>
+          <a:noFill/>
+        </p:spPr>
+        <p:txBody>
+          <a:bodyPr wrap="square" rtlCol="0">
+            <a:spAutoFit/>
+          </a:bodyPr>
+          <a:lstStyle/>
+          <a:p>
+            <a:r>
+              <a:rPr lang="pt-BR" dirty="0"/>
+              <a:t>Pitch</a:t>
+            </a:r>
+          </a:p>
+        </p:txBody>
+      </p:sp>
+      <p:sp>
+        <p:nvSpPr>
+          <p:cNvPr id="1030" name="CaixaDeTexto 1029">
+            <a:extLst>
+              <a:ext uri="{FF2B5EF4-FFF2-40B4-BE49-F238E27FC236}">
+                <a16:creationId xmlns:a16="http://schemas.microsoft.com/office/drawing/2014/main" id="{E151B1C5-7D04-4CC2-B116-91FFDABF4CFA}"/>
+              </a:ext>
+            </a:extLst>
+          </p:cNvPr>
+          <p:cNvSpPr txBox="1"/>
+          <p:nvPr/>
+        </p:nvSpPr>
+        <p:spPr>
+          <a:xfrm>
+            <a:off x="3691476" y="5074195"/>
+            <a:ext cx="4881192" cy="369332"/>
+          </a:xfrm>
+          <a:prstGeom prst="rect">
+            <a:avLst/>
+          </a:prstGeom>
+          <a:noFill/>
+        </p:spPr>
+        <p:txBody>
+          <a:bodyPr wrap="square" rtlCol="0">
+            <a:spAutoFit/>
+          </a:bodyPr>
+          <a:lstStyle/>
+          <a:p>
+            <a:r>
+              <a:rPr lang="pt-BR" dirty="0"/>
+              <a:t>Controles analógicos para movimentação do VANT</a:t>
+            </a:r>
+          </a:p>
+        </p:txBody>
+      </p:sp>
+    </p:spTree>
+    <p:extLst>
+      <p:ext uri="{BB962C8B-B14F-4D97-AF65-F5344CB8AC3E}">
+        <p14:creationId xmlns:p14="http://schemas.microsoft.com/office/powerpoint/2010/main" val="154906040"/>
+      </p:ext>
+    </p:extLst>
+  </p:cSld>
+  <p:clrMapOvr>
+    <a:masterClrMapping/>
+  </p:clrMapOvr>
+</p:sld>
+</file>
+
+<file path=ppt/slides/slide7.xml><?xml version="1.0" encoding="utf-8"?>
+<p:sld xmlns:a="http://schemas.openxmlformats.org/drawingml/2006/main" xmlns:r="http://schemas.openxmlformats.org/officeDocument/2006/relationships" xmlns:p="http://schemas.openxmlformats.org/presentationml/2006/main">
+  <p:cSld>
+    <p:spTree>
+      <p:nvGrpSpPr>
+        <p:cNvPr id="1" name=""/>
+        <p:cNvGrpSpPr/>
+        <p:nvPr/>
+      </p:nvGrpSpPr>
+      <p:grpSpPr>
+        <a:xfrm>
+          <a:off x="0" y="0"/>
+          <a:ext cx="0" cy="0"/>
+          <a:chOff x="0" y="0"/>
+          <a:chExt cx="0" cy="0"/>
+        </a:xfrm>
+      </p:grpSpPr>
+      <p:sp>
+        <p:nvSpPr>
+          <p:cNvPr id="5" name="Retângulo 4">
+            <a:extLst>
+              <a:ext uri="{FF2B5EF4-FFF2-40B4-BE49-F238E27FC236}">
+                <a16:creationId xmlns:a16="http://schemas.microsoft.com/office/drawing/2014/main" id="{A98D1E91-0373-465D-8BBF-8936A09AB67E}"/>
+              </a:ext>
+            </a:extLst>
+          </p:cNvPr>
+          <p:cNvSpPr/>
+          <p:nvPr/>
+        </p:nvSpPr>
+        <p:spPr>
+          <a:xfrm>
+            <a:off x="5222449" y="716437"/>
+            <a:ext cx="5024487" cy="3544478"/>
+          </a:xfrm>
+          <a:prstGeom prst="rect">
+            <a:avLst/>
+          </a:prstGeom>
+          <a:noFill/>
+          <a:ln w="50800"/>
+        </p:spPr>
+        <p:style>
+          <a:lnRef idx="2">
+            <a:schemeClr val="accent1">
+              <a:shade val="50000"/>
+            </a:schemeClr>
+          </a:lnRef>
+          <a:fillRef idx="1">
+            <a:schemeClr val="accent1"/>
+          </a:fillRef>
+          <a:effectRef idx="0">
+            <a:schemeClr val="accent1"/>
+          </a:effectRef>
+          <a:fontRef idx="minor">
+            <a:schemeClr val="lt1"/>
+          </a:fontRef>
+        </p:style>
+        <p:txBody>
+          <a:bodyPr rtlCol="0" anchor="ctr"/>
+          <a:lstStyle/>
+          <a:p>
+            <a:pPr algn="ctr"/>
+            <a:endParaRPr lang="pt-BR"/>
+          </a:p>
+        </p:txBody>
+      </p:sp>
+      <p:sp>
+        <p:nvSpPr>
+          <p:cNvPr id="4" name="Retângulo 3">
+            <a:extLst>
+              <a:ext uri="{FF2B5EF4-FFF2-40B4-BE49-F238E27FC236}">
+                <a16:creationId xmlns:a16="http://schemas.microsoft.com/office/drawing/2014/main" id="{4299EE78-0A11-464C-A705-FEAEF31BF9B0}"/>
+              </a:ext>
+            </a:extLst>
+          </p:cNvPr>
+          <p:cNvSpPr/>
+          <p:nvPr/>
+        </p:nvSpPr>
+        <p:spPr>
+          <a:xfrm>
+            <a:off x="1329179" y="2413262"/>
+            <a:ext cx="5024487" cy="3544478"/>
+          </a:xfrm>
+          <a:prstGeom prst="rect">
+            <a:avLst/>
+          </a:prstGeom>
+          <a:noFill/>
+          <a:ln w="50800"/>
+        </p:spPr>
+        <p:style>
+          <a:lnRef idx="2">
+            <a:schemeClr val="accent1">
+              <a:shade val="50000"/>
+            </a:schemeClr>
+          </a:lnRef>
+          <a:fillRef idx="1">
+            <a:schemeClr val="accent1"/>
+          </a:fillRef>
+          <a:effectRef idx="0">
+            <a:schemeClr val="accent1"/>
+          </a:effectRef>
+          <a:fontRef idx="minor">
+            <a:schemeClr val="lt1"/>
+          </a:fontRef>
+        </p:style>
+        <p:txBody>
+          <a:bodyPr rtlCol="0" anchor="ctr"/>
+          <a:lstStyle/>
+          <a:p>
+            <a:pPr algn="ctr"/>
+            <a:endParaRPr lang="pt-BR"/>
+          </a:p>
+        </p:txBody>
+      </p:sp>
+      <p:cxnSp>
+        <p:nvCxnSpPr>
+          <p:cNvPr id="8" name="Conector reto 7">
+            <a:extLst>
+              <a:ext uri="{FF2B5EF4-FFF2-40B4-BE49-F238E27FC236}">
+                <a16:creationId xmlns:a16="http://schemas.microsoft.com/office/drawing/2014/main" id="{FDAFFE01-3B9F-404F-B98A-8BE904FED530}"/>
+              </a:ext>
+            </a:extLst>
+          </p:cNvPr>
+          <p:cNvCxnSpPr/>
+          <p:nvPr/>
+        </p:nvCxnSpPr>
+        <p:spPr>
+          <a:xfrm flipV="1">
+            <a:off x="6353666" y="4260915"/>
+            <a:ext cx="3893270" cy="1696825"/>
+          </a:xfrm>
+          <a:prstGeom prst="line">
+            <a:avLst/>
+          </a:prstGeom>
+          <a:ln w="50800"/>
+        </p:spPr>
+        <p:style>
+          <a:lnRef idx="1">
+            <a:schemeClr val="accent1"/>
+          </a:lnRef>
+          <a:fillRef idx="0">
+            <a:schemeClr val="accent1"/>
+          </a:fillRef>
+          <a:effectRef idx="0">
+            <a:schemeClr val="accent1"/>
+          </a:effectRef>
+          <a:fontRef idx="minor">
+            <a:schemeClr val="tx1"/>
+          </a:fontRef>
+        </p:style>
+      </p:cxnSp>
+      <p:cxnSp>
+        <p:nvCxnSpPr>
+          <p:cNvPr id="10" name="Conector reto 9">
+            <a:extLst>
+              <a:ext uri="{FF2B5EF4-FFF2-40B4-BE49-F238E27FC236}">
+                <a16:creationId xmlns:a16="http://schemas.microsoft.com/office/drawing/2014/main" id="{39B2898A-B320-4A7C-B75B-595D81853FD9}"/>
+              </a:ext>
+            </a:extLst>
+          </p:cNvPr>
+          <p:cNvCxnSpPr/>
+          <p:nvPr/>
+        </p:nvCxnSpPr>
+        <p:spPr>
+          <a:xfrm flipV="1">
+            <a:off x="6353666" y="716437"/>
+            <a:ext cx="3893270" cy="1696825"/>
+          </a:xfrm>
+          <a:prstGeom prst="line">
+            <a:avLst/>
+          </a:prstGeom>
+          <a:ln w="50800"/>
+        </p:spPr>
+        <p:style>
+          <a:lnRef idx="1">
+            <a:schemeClr val="accent1"/>
+          </a:lnRef>
+          <a:fillRef idx="0">
+            <a:schemeClr val="accent1"/>
+          </a:fillRef>
+          <a:effectRef idx="0">
+            <a:schemeClr val="accent1"/>
+          </a:effectRef>
+          <a:fontRef idx="minor">
+            <a:schemeClr val="tx1"/>
+          </a:fontRef>
+        </p:style>
+      </p:cxnSp>
+      <p:cxnSp>
+        <p:nvCxnSpPr>
+          <p:cNvPr id="12" name="Conector reto 11">
+            <a:extLst>
+              <a:ext uri="{FF2B5EF4-FFF2-40B4-BE49-F238E27FC236}">
+                <a16:creationId xmlns:a16="http://schemas.microsoft.com/office/drawing/2014/main" id="{C151BA9E-40C4-49BE-9AC4-F1126746553A}"/>
+              </a:ext>
+            </a:extLst>
+          </p:cNvPr>
+          <p:cNvCxnSpPr/>
+          <p:nvPr/>
+        </p:nvCxnSpPr>
+        <p:spPr>
+          <a:xfrm flipV="1">
+            <a:off x="1332689" y="4260915"/>
+            <a:ext cx="3889760" cy="1696825"/>
+          </a:xfrm>
+          <a:prstGeom prst="line">
+            <a:avLst/>
+          </a:prstGeom>
+          <a:ln w="50800"/>
+        </p:spPr>
+        <p:style>
+          <a:lnRef idx="1">
+            <a:schemeClr val="accent1"/>
+          </a:lnRef>
+          <a:fillRef idx="0">
+            <a:schemeClr val="accent1"/>
+          </a:fillRef>
+          <a:effectRef idx="0">
+            <a:schemeClr val="accent1"/>
+          </a:effectRef>
+          <a:fontRef idx="minor">
+            <a:schemeClr val="tx1"/>
+          </a:fontRef>
+        </p:style>
+      </p:cxnSp>
+      <p:cxnSp>
+        <p:nvCxnSpPr>
+          <p:cNvPr id="14" name="Conector reto 13">
+            <a:extLst>
+              <a:ext uri="{FF2B5EF4-FFF2-40B4-BE49-F238E27FC236}">
+                <a16:creationId xmlns:a16="http://schemas.microsoft.com/office/drawing/2014/main" id="{8FC0991A-A39B-476B-A658-1427960AA1F6}"/>
+              </a:ext>
+            </a:extLst>
+          </p:cNvPr>
+          <p:cNvCxnSpPr/>
+          <p:nvPr/>
+        </p:nvCxnSpPr>
+        <p:spPr>
+          <a:xfrm flipV="1">
+            <a:off x="1329179" y="716437"/>
+            <a:ext cx="3893270" cy="1696825"/>
+          </a:xfrm>
+          <a:prstGeom prst="line">
+            <a:avLst/>
+          </a:prstGeom>
+          <a:ln w="50800"/>
+        </p:spPr>
+        <p:style>
+          <a:lnRef idx="1">
+            <a:schemeClr val="accent1"/>
+          </a:lnRef>
+          <a:fillRef idx="0">
+            <a:schemeClr val="accent1"/>
+          </a:fillRef>
+          <a:effectRef idx="0">
+            <a:schemeClr val="accent1"/>
+          </a:effectRef>
+          <a:fontRef idx="minor">
+            <a:schemeClr val="tx1"/>
+          </a:fontRef>
+        </p:style>
+      </p:cxnSp>
+      <p:sp>
+        <p:nvSpPr>
+          <p:cNvPr id="15" name="Retângulo 14">
+            <a:extLst>
+              <a:ext uri="{FF2B5EF4-FFF2-40B4-BE49-F238E27FC236}">
+                <a16:creationId xmlns:a16="http://schemas.microsoft.com/office/drawing/2014/main" id="{EEB3C635-E4B8-4C88-A46F-479153F3AB71}"/>
+              </a:ext>
+            </a:extLst>
+          </p:cNvPr>
+          <p:cNvSpPr/>
+          <p:nvPr/>
+        </p:nvSpPr>
+        <p:spPr>
+          <a:xfrm>
+            <a:off x="1864952" y="2821021"/>
+            <a:ext cx="3972496" cy="2787326"/>
+          </a:xfrm>
+          <a:prstGeom prst="rect">
+            <a:avLst/>
+          </a:prstGeom>
+          <a:noFill/>
+        </p:spPr>
+        <p:style>
+          <a:lnRef idx="2">
+            <a:schemeClr val="accent1">
+              <a:shade val="50000"/>
+            </a:schemeClr>
+          </a:lnRef>
+          <a:fillRef idx="1">
+            <a:schemeClr val="accent1"/>
+          </a:fillRef>
+          <a:effectRef idx="0">
+            <a:schemeClr val="accent1"/>
+          </a:effectRef>
+          <a:fontRef idx="minor">
+            <a:schemeClr val="lt1"/>
+          </a:fontRef>
+        </p:style>
+        <p:txBody>
+          <a:bodyPr rtlCol="0" anchor="ctr"/>
+          <a:lstStyle/>
+          <a:p>
+            <a:pPr algn="ctr"/>
+            <a:endParaRPr lang="pt-BR"/>
+          </a:p>
+        </p:txBody>
+      </p:sp>
+      <p:sp>
+        <p:nvSpPr>
+          <p:cNvPr id="16" name="Retângulo 15">
+            <a:extLst>
+              <a:ext uri="{FF2B5EF4-FFF2-40B4-BE49-F238E27FC236}">
+                <a16:creationId xmlns:a16="http://schemas.microsoft.com/office/drawing/2014/main" id="{5D83E867-5AD3-47DA-8D78-3560B9B43F80}"/>
+              </a:ext>
+            </a:extLst>
+          </p:cNvPr>
+          <p:cNvSpPr/>
+          <p:nvPr/>
+        </p:nvSpPr>
+        <p:spPr>
+          <a:xfrm>
+            <a:off x="4982417" y="1456542"/>
+            <a:ext cx="3972496" cy="2787326"/>
+          </a:xfrm>
+          <a:prstGeom prst="rect">
+            <a:avLst/>
+          </a:prstGeom>
+          <a:noFill/>
+        </p:spPr>
+        <p:style>
+          <a:lnRef idx="2">
+            <a:schemeClr val="accent1">
+              <a:shade val="50000"/>
+            </a:schemeClr>
+          </a:lnRef>
+          <a:fillRef idx="1">
+            <a:schemeClr val="accent1"/>
+          </a:fillRef>
+          <a:effectRef idx="0">
+            <a:schemeClr val="accent1"/>
+          </a:effectRef>
+          <a:fontRef idx="minor">
+            <a:schemeClr val="lt1"/>
+          </a:fontRef>
+        </p:style>
+        <p:txBody>
+          <a:bodyPr rtlCol="0" anchor="ctr"/>
+          <a:lstStyle/>
+          <a:p>
+            <a:pPr algn="ctr"/>
+            <a:endParaRPr lang="pt-BR"/>
+          </a:p>
+        </p:txBody>
+      </p:sp>
+      <p:cxnSp>
+        <p:nvCxnSpPr>
+          <p:cNvPr id="18" name="Conector reto 17">
+            <a:extLst>
+              <a:ext uri="{FF2B5EF4-FFF2-40B4-BE49-F238E27FC236}">
+                <a16:creationId xmlns:a16="http://schemas.microsoft.com/office/drawing/2014/main" id="{C04180DE-32CE-43FE-B8D0-894F905A9215}"/>
+              </a:ext>
+            </a:extLst>
+          </p:cNvPr>
+          <p:cNvCxnSpPr>
+            <a:cxnSpLocks/>
+          </p:cNvCxnSpPr>
+          <p:nvPr/>
+        </p:nvCxnSpPr>
+        <p:spPr>
+          <a:xfrm flipV="1">
+            <a:off x="5837448" y="4243868"/>
+            <a:ext cx="3117465" cy="1364480"/>
+          </a:xfrm>
+          <a:prstGeom prst="line">
+            <a:avLst/>
+          </a:prstGeom>
+        </p:spPr>
+        <p:style>
+          <a:lnRef idx="1">
+            <a:schemeClr val="accent1"/>
+          </a:lnRef>
+          <a:fillRef idx="0">
+            <a:schemeClr val="accent1"/>
+          </a:fillRef>
+          <a:effectRef idx="0">
+            <a:schemeClr val="accent1"/>
+          </a:effectRef>
+          <a:fontRef idx="minor">
+            <a:schemeClr val="tx1"/>
+          </a:fontRef>
+        </p:style>
+      </p:cxnSp>
+      <p:cxnSp>
+        <p:nvCxnSpPr>
+          <p:cNvPr id="20" name="Conector reto 19">
+            <a:extLst>
+              <a:ext uri="{FF2B5EF4-FFF2-40B4-BE49-F238E27FC236}">
+                <a16:creationId xmlns:a16="http://schemas.microsoft.com/office/drawing/2014/main" id="{657DAF16-F885-4A6C-94F6-C9AD3CADD7C8}"/>
+              </a:ext>
+            </a:extLst>
+          </p:cNvPr>
+          <p:cNvCxnSpPr>
+            <a:cxnSpLocks/>
+          </p:cNvCxnSpPr>
+          <p:nvPr/>
+        </p:nvCxnSpPr>
+        <p:spPr>
+          <a:xfrm flipV="1">
+            <a:off x="5837448" y="1456542"/>
+            <a:ext cx="3117465" cy="1364480"/>
+          </a:xfrm>
+          <a:prstGeom prst="line">
+            <a:avLst/>
+          </a:prstGeom>
+        </p:spPr>
+        <p:style>
+          <a:lnRef idx="1">
+            <a:schemeClr val="accent1"/>
+          </a:lnRef>
+          <a:fillRef idx="0">
+            <a:schemeClr val="accent1"/>
+          </a:fillRef>
+          <a:effectRef idx="0">
+            <a:schemeClr val="accent1"/>
+          </a:effectRef>
+          <a:fontRef idx="minor">
+            <a:schemeClr val="tx1"/>
+          </a:fontRef>
+        </p:style>
+      </p:cxnSp>
+      <p:cxnSp>
+        <p:nvCxnSpPr>
+          <p:cNvPr id="22" name="Conector reto 21">
+            <a:extLst>
+              <a:ext uri="{FF2B5EF4-FFF2-40B4-BE49-F238E27FC236}">
+                <a16:creationId xmlns:a16="http://schemas.microsoft.com/office/drawing/2014/main" id="{55431560-3C3E-4CBF-9D52-58515047001B}"/>
+              </a:ext>
+            </a:extLst>
+          </p:cNvPr>
+          <p:cNvCxnSpPr>
+            <a:cxnSpLocks/>
+          </p:cNvCxnSpPr>
+          <p:nvPr/>
+        </p:nvCxnSpPr>
+        <p:spPr>
+          <a:xfrm flipV="1">
+            <a:off x="1864952" y="1456542"/>
+            <a:ext cx="3117465" cy="1364479"/>
+          </a:xfrm>
+          <a:prstGeom prst="line">
+            <a:avLst/>
+          </a:prstGeom>
+        </p:spPr>
+        <p:style>
+          <a:lnRef idx="1">
+            <a:schemeClr val="accent1"/>
+          </a:lnRef>
+          <a:fillRef idx="0">
+            <a:schemeClr val="accent1"/>
+          </a:fillRef>
+          <a:effectRef idx="0">
+            <a:schemeClr val="accent1"/>
+          </a:effectRef>
+          <a:fontRef idx="minor">
+            <a:schemeClr val="tx1"/>
+          </a:fontRef>
+        </p:style>
+      </p:cxnSp>
+      <p:cxnSp>
+        <p:nvCxnSpPr>
+          <p:cNvPr id="24" name="Conector reto 23">
+            <a:extLst>
+              <a:ext uri="{FF2B5EF4-FFF2-40B4-BE49-F238E27FC236}">
+                <a16:creationId xmlns:a16="http://schemas.microsoft.com/office/drawing/2014/main" id="{51D2B8AF-4124-4A87-A9D7-6294BEF83E18}"/>
+              </a:ext>
+            </a:extLst>
+          </p:cNvPr>
+          <p:cNvCxnSpPr>
+            <a:cxnSpLocks/>
+          </p:cNvCxnSpPr>
+          <p:nvPr/>
+        </p:nvCxnSpPr>
+        <p:spPr>
+          <a:xfrm flipV="1">
+            <a:off x="1855174" y="4243868"/>
+            <a:ext cx="3127243" cy="1335297"/>
+          </a:xfrm>
+          <a:prstGeom prst="line">
+            <a:avLst/>
+          </a:prstGeom>
+        </p:spPr>
+        <p:style>
+          <a:lnRef idx="1">
+            <a:schemeClr val="accent1"/>
+          </a:lnRef>
+          <a:fillRef idx="0">
+            <a:schemeClr val="accent1"/>
+          </a:fillRef>
+          <a:effectRef idx="0">
+            <a:schemeClr val="accent1"/>
+          </a:effectRef>
+          <a:fontRef idx="minor">
+            <a:schemeClr val="tx1"/>
+          </a:fontRef>
+        </p:style>
+      </p:cxnSp>
+      <p:sp>
+        <p:nvSpPr>
+          <p:cNvPr id="32" name="Forma Livre: Forma 31">
+            <a:extLst>
+              <a:ext uri="{FF2B5EF4-FFF2-40B4-BE49-F238E27FC236}">
+                <a16:creationId xmlns:a16="http://schemas.microsoft.com/office/drawing/2014/main" id="{EBFAF327-1DAC-4B82-9527-9963D3DBD46A}"/>
+              </a:ext>
+            </a:extLst>
+          </p:cNvPr>
+          <p:cNvSpPr/>
+          <p:nvPr/>
+        </p:nvSpPr>
+        <p:spPr>
+          <a:xfrm>
+            <a:off x="1906621" y="1456542"/>
+            <a:ext cx="7577847" cy="4175773"/>
+          </a:xfrm>
+          <a:custGeom>
+            <a:avLst/>
+            <a:gdLst>
+              <a:gd name="connsiteX0" fmla="*/ 0 w 7540079"/>
+              <a:gd name="connsiteY0" fmla="*/ 4191995 h 4191995"/>
+              <a:gd name="connsiteX1" fmla="*/ 1624519 w 7540079"/>
+              <a:gd name="connsiteY1" fmla="*/ 3929348 h 4191995"/>
+              <a:gd name="connsiteX2" fmla="*/ 1955260 w 7540079"/>
+              <a:gd name="connsiteY2" fmla="*/ 3822344 h 4191995"/>
+              <a:gd name="connsiteX3" fmla="*/ 1809345 w 7540079"/>
+              <a:gd name="connsiteY3" fmla="*/ 2810667 h 4191995"/>
+              <a:gd name="connsiteX4" fmla="*/ 2762656 w 7540079"/>
+              <a:gd name="connsiteY4" fmla="*/ 2791212 h 4191995"/>
+              <a:gd name="connsiteX5" fmla="*/ 3638145 w 7540079"/>
+              <a:gd name="connsiteY5" fmla="*/ 1905995 h 4191995"/>
+              <a:gd name="connsiteX6" fmla="*/ 5009745 w 7540079"/>
+              <a:gd name="connsiteY6" fmla="*/ 2149186 h 4191995"/>
+              <a:gd name="connsiteX7" fmla="*/ 5953328 w 7540079"/>
+              <a:gd name="connsiteY7" fmla="*/ 1079144 h 4191995"/>
+              <a:gd name="connsiteX8" fmla="*/ 5797685 w 7540079"/>
+              <a:gd name="connsiteY8" fmla="*/ 651127 h 4191995"/>
+              <a:gd name="connsiteX9" fmla="*/ 6906639 w 7540079"/>
+              <a:gd name="connsiteY9" fmla="*/ 1400157 h 4191995"/>
+              <a:gd name="connsiteX10" fmla="*/ 7538936 w 7540079"/>
+              <a:gd name="connsiteY10" fmla="*/ 845680 h 4191995"/>
+              <a:gd name="connsiteX11" fmla="*/ 7062281 w 7540079"/>
+              <a:gd name="connsiteY11" fmla="*/ 77195 h 4191995"/>
+              <a:gd name="connsiteX12" fmla="*/ 7062281 w 7540079"/>
+              <a:gd name="connsiteY12" fmla="*/ 67467 h 4191995"/>
+            </a:gdLst>
+            <a:ahLst/>
+            <a:cxnLst>
+              <a:cxn ang="0">
+                <a:pos x="connsiteX0" y="connsiteY0"/>
+              </a:cxn>
+              <a:cxn ang="0">
+                <a:pos x="connsiteX1" y="connsiteY1"/>
+              </a:cxn>
+              <a:cxn ang="0">
+                <a:pos x="connsiteX2" y="connsiteY2"/>
+              </a:cxn>
+              <a:cxn ang="0">
+                <a:pos x="connsiteX3" y="connsiteY3"/>
+              </a:cxn>
+              <a:cxn ang="0">
+                <a:pos x="connsiteX4" y="connsiteY4"/>
+              </a:cxn>
+              <a:cxn ang="0">
+                <a:pos x="connsiteX5" y="connsiteY5"/>
+              </a:cxn>
+              <a:cxn ang="0">
+                <a:pos x="connsiteX6" y="connsiteY6"/>
+              </a:cxn>
+              <a:cxn ang="0">
+                <a:pos x="connsiteX7" y="connsiteY7"/>
+              </a:cxn>
+              <a:cxn ang="0">
+                <a:pos x="connsiteX8" y="connsiteY8"/>
+              </a:cxn>
+              <a:cxn ang="0">
+                <a:pos x="connsiteX9" y="connsiteY9"/>
+              </a:cxn>
+              <a:cxn ang="0">
+                <a:pos x="connsiteX10" y="connsiteY10"/>
+              </a:cxn>
+              <a:cxn ang="0">
+                <a:pos x="connsiteX11" y="connsiteY11"/>
+              </a:cxn>
+              <a:cxn ang="0">
+                <a:pos x="connsiteX12" y="connsiteY12"/>
+              </a:cxn>
+            </a:cxnLst>
+            <a:rect l="l" t="t" r="r" b="b"/>
+            <a:pathLst>
+              <a:path w="7540079" h="4191995">
+                <a:moveTo>
+                  <a:pt x="0" y="4191995"/>
+                </a:moveTo>
+                <a:lnTo>
+                  <a:pt x="1624519" y="3929348"/>
+                </a:lnTo>
+                <a:cubicBezTo>
+                  <a:pt x="1950396" y="3867740"/>
+                  <a:pt x="1924456" y="4008791"/>
+                  <a:pt x="1955260" y="3822344"/>
+                </a:cubicBezTo>
+                <a:cubicBezTo>
+                  <a:pt x="1986064" y="3635897"/>
+                  <a:pt x="1674779" y="2982522"/>
+                  <a:pt x="1809345" y="2810667"/>
+                </a:cubicBezTo>
+                <a:cubicBezTo>
+                  <a:pt x="1943911" y="2638812"/>
+                  <a:pt x="2457856" y="2941991"/>
+                  <a:pt x="2762656" y="2791212"/>
+                </a:cubicBezTo>
+                <a:cubicBezTo>
+                  <a:pt x="3067456" y="2640433"/>
+                  <a:pt x="3263630" y="2012999"/>
+                  <a:pt x="3638145" y="1905995"/>
+                </a:cubicBezTo>
+                <a:cubicBezTo>
+                  <a:pt x="4012660" y="1798991"/>
+                  <a:pt x="4623881" y="2286994"/>
+                  <a:pt x="5009745" y="2149186"/>
+                </a:cubicBezTo>
+                <a:cubicBezTo>
+                  <a:pt x="5395609" y="2011377"/>
+                  <a:pt x="5822005" y="1328821"/>
+                  <a:pt x="5953328" y="1079144"/>
+                </a:cubicBezTo>
+                <a:cubicBezTo>
+                  <a:pt x="6084651" y="829467"/>
+                  <a:pt x="5638800" y="597625"/>
+                  <a:pt x="5797685" y="651127"/>
+                </a:cubicBezTo>
+                <a:cubicBezTo>
+                  <a:pt x="5956570" y="704629"/>
+                  <a:pt x="6616431" y="1367732"/>
+                  <a:pt x="6906639" y="1400157"/>
+                </a:cubicBezTo>
+                <a:cubicBezTo>
+                  <a:pt x="7196847" y="1432582"/>
+                  <a:pt x="7512996" y="1066174"/>
+                  <a:pt x="7538936" y="845680"/>
+                </a:cubicBezTo>
+                <a:cubicBezTo>
+                  <a:pt x="7564876" y="625186"/>
+                  <a:pt x="7141723" y="206897"/>
+                  <a:pt x="7062281" y="77195"/>
+                </a:cubicBezTo>
+                <a:cubicBezTo>
+                  <a:pt x="6982839" y="-52507"/>
+                  <a:pt x="7022560" y="7480"/>
+                  <a:pt x="7062281" y="67467"/>
+                </a:cubicBezTo>
+              </a:path>
+            </a:pathLst>
+          </a:custGeom>
+          <a:noFill/>
+          <a:ln w="31750">
+            <a:solidFill>
+              <a:srgbClr val="00B050"/>
+            </a:solidFill>
+          </a:ln>
+        </p:spPr>
+        <p:style>
+          <a:lnRef idx="2">
+            <a:schemeClr val="accent1">
+              <a:shade val="50000"/>
+            </a:schemeClr>
+          </a:lnRef>
+          <a:fillRef idx="1">
+            <a:schemeClr val="accent1"/>
+          </a:fillRef>
+          <a:effectRef idx="0">
+            <a:schemeClr val="accent1"/>
+          </a:effectRef>
+          <a:fontRef idx="minor">
+            <a:schemeClr val="lt1"/>
+          </a:fontRef>
+        </p:style>
+        <p:txBody>
+          <a:bodyPr rtlCol="0" anchor="ctr"/>
+          <a:lstStyle/>
+          <a:p>
+            <a:pPr algn="ctr"/>
+            <a:endParaRPr lang="pt-BR" dirty="0"/>
+          </a:p>
+        </p:txBody>
+      </p:sp>
+      <p:sp>
+        <p:nvSpPr>
+          <p:cNvPr id="30" name="Elipse 29">
+            <a:extLst>
+              <a:ext uri="{FF2B5EF4-FFF2-40B4-BE49-F238E27FC236}">
+                <a16:creationId xmlns:a16="http://schemas.microsoft.com/office/drawing/2014/main" id="{2C1E44D0-36EC-43AC-9A7C-19A0F3AE9EE1}"/>
+              </a:ext>
+            </a:extLst>
+          </p:cNvPr>
+          <p:cNvSpPr/>
+          <p:nvPr/>
+        </p:nvSpPr>
+        <p:spPr>
+          <a:xfrm>
+            <a:off x="8846501" y="1427358"/>
+            <a:ext cx="223736" cy="145915"/>
+          </a:xfrm>
+          <a:prstGeom prst="ellipse">
+            <a:avLst/>
+          </a:prstGeom>
+          <a:solidFill>
+            <a:srgbClr val="FF0000"/>
+          </a:solidFill>
+        </p:spPr>
+        <p:style>
+          <a:lnRef idx="2">
+            <a:schemeClr val="accent1">
+              <a:shade val="50000"/>
+            </a:schemeClr>
+          </a:lnRef>
+          <a:fillRef idx="1">
+            <a:schemeClr val="accent1"/>
+          </a:fillRef>
+          <a:effectRef idx="0">
+            <a:schemeClr val="accent1"/>
+          </a:effectRef>
+          <a:fontRef idx="minor">
+            <a:schemeClr val="lt1"/>
+          </a:fontRef>
+        </p:style>
+        <p:txBody>
+          <a:bodyPr rtlCol="0" anchor="ctr"/>
+          <a:lstStyle/>
+          <a:p>
+            <a:pPr algn="ctr"/>
+            <a:endParaRPr lang="pt-BR"/>
+          </a:p>
+        </p:txBody>
+      </p:sp>
+      <p:pic>
+        <p:nvPicPr>
+          <p:cNvPr id="31" name="Imagem 30">
+            <a:extLst>
+              <a:ext uri="{FF2B5EF4-FFF2-40B4-BE49-F238E27FC236}">
+                <a16:creationId xmlns:a16="http://schemas.microsoft.com/office/drawing/2014/main" id="{D0C3F3BC-FD57-4269-A30F-A9BFBD5E6986}"/>
+              </a:ext>
+            </a:extLst>
+          </p:cNvPr>
+          <p:cNvPicPr>
+            <a:picLocks noChangeAspect="1"/>
+          </p:cNvPicPr>
+          <p:nvPr/>
+        </p:nvPicPr>
+        <p:blipFill rotWithShape="1">
+          <a:blip r:embed="rId2">
+            <a:extLst>
+              <a:ext uri="{BEBA8EAE-BF5A-486C-A8C5-ECC9F3942E4B}">
+                <a14:imgProps xmlns:a14="http://schemas.microsoft.com/office/drawing/2010/main">
+                  <a14:imgLayer r:embed="rId3">
+                    <a14:imgEffect>
+                      <a14:backgroundRemoval t="61589" b="89643" l="10519" r="33110">
+                        <a14:foregroundMark x1="26923" y1="65849" x2="26923" y2="65849"/>
+                        <a14:foregroundMark x1="25231" y1="65849" x2="21077" y2="66375"/>
+                        <a14:foregroundMark x1="22308" y1="67075" x2="25692" y2="68827"/>
+                        <a14:foregroundMark x1="25692" y1="68827" x2="17538" y2="83012"/>
+                        <a14:foregroundMark x1="19077" y1="84764" x2="29231" y2="75131"/>
+                        <a14:foregroundMark x1="29231" y1="74781" x2="17538" y2="80035"/>
+                        <a14:foregroundMark x1="15231" y1="76708" x2="18462" y2="70753"/>
+                        <a14:foregroundMark x1="29538" y1="71103" x2="20769" y2="84764"/>
+                      </a14:backgroundRemoval>
+                    </a14:imgEffect>
+                  </a14:imgLayer>
+                </a14:imgProps>
+              </a:ext>
+              <a:ext uri="{28A0092B-C50C-407E-A947-70E740481C1C}">
+                <a14:useLocalDpi xmlns:a14="http://schemas.microsoft.com/office/drawing/2010/main" val="0"/>
+              </a:ext>
+            </a:extLst>
+          </a:blip>
+          <a:srcRect l="7695" t="58082" r="64066" b="6850"/>
+          <a:stretch/>
+        </p:blipFill>
+        <p:spPr>
+          <a:xfrm>
+            <a:off x="1466183" y="5108349"/>
+            <a:ext cx="843418" cy="920092"/>
+          </a:xfrm>
+          <a:prstGeom prst="rect">
+            <a:avLst/>
+          </a:prstGeom>
+        </p:spPr>
+      </p:pic>
+    </p:spTree>
+    <p:extLst>
+      <p:ext uri="{BB962C8B-B14F-4D97-AF65-F5344CB8AC3E}">
+        <p14:creationId xmlns:p14="http://schemas.microsoft.com/office/powerpoint/2010/main" val="1924155513"/>
+      </p:ext>
+    </p:extLst>
+  </p:cSld>
+  <p:clrMapOvr>
+    <a:masterClrMapping/>
+  </p:clrMapOvr>
+</p:sld>
+</file>
+
+<file path=ppt/slides/slide8.xml><?xml version="1.0" encoding="utf-8"?>
+<p:sld xmlns:a="http://schemas.openxmlformats.org/drawingml/2006/main" xmlns:r="http://schemas.openxmlformats.org/officeDocument/2006/relationships" xmlns:p="http://schemas.openxmlformats.org/presentationml/2006/main">
+  <p:cSld>
+    <p:spTree>
+      <p:nvGrpSpPr>
+        <p:cNvPr id="1" name=""/>
+        <p:cNvGrpSpPr/>
+        <p:nvPr/>
+      </p:nvGrpSpPr>
+      <p:grpSpPr>
+        <a:xfrm>
+          <a:off x="0" y="0"/>
+          <a:ext cx="0" cy="0"/>
+          <a:chOff x="0" y="0"/>
+          <a:chExt cx="0" cy="0"/>
+        </a:xfrm>
+      </p:grpSpPr>
+      <p:pic>
+        <p:nvPicPr>
+          <p:cNvPr id="5" name="Imagem 4">
+            <a:extLst>
+              <a:ext uri="{FF2B5EF4-FFF2-40B4-BE49-F238E27FC236}">
+                <a16:creationId xmlns:a16="http://schemas.microsoft.com/office/drawing/2014/main" id="{2F9DBE7C-ECAF-446E-82DE-503FA067F74F}"/>
+              </a:ext>
+            </a:extLst>
+          </p:cNvPr>
+          <p:cNvPicPr>
+            <a:picLocks noChangeAspect="1"/>
+          </p:cNvPicPr>
+          <p:nvPr/>
+        </p:nvPicPr>
+        <p:blipFill rotWithShape="1">
+          <a:blip r:embed="rId2">
+            <a:extLst>
+              <a:ext uri="{BEBA8EAE-BF5A-486C-A8C5-ECC9F3942E4B}">
+                <a14:imgProps xmlns:a14="http://schemas.microsoft.com/office/drawing/2010/main">
+                  <a14:imgLayer r:embed="rId3">
+                    <a14:imgEffect>
+                      <a14:backgroundRemoval t="61589" b="89643" l="10519" r="33110">
+                        <a14:foregroundMark x1="26923" y1="65849" x2="26923" y2="65849"/>
+                        <a14:foregroundMark x1="25231" y1="65849" x2="21077" y2="66375"/>
+                        <a14:foregroundMark x1="22308" y1="67075" x2="25692" y2="68827"/>
+                        <a14:foregroundMark x1="25692" y1="68827" x2="17538" y2="83012"/>
+                        <a14:foregroundMark x1="19077" y1="84764" x2="29231" y2="75131"/>
+                        <a14:foregroundMark x1="29231" y1="74781" x2="17538" y2="80035"/>
+                        <a14:foregroundMark x1="15231" y1="76708" x2="18462" y2="70753"/>
+                        <a14:foregroundMark x1="29538" y1="71103" x2="20769" y2="84764"/>
+                      </a14:backgroundRemoval>
+                    </a14:imgEffect>
+                  </a14:imgLayer>
+                </a14:imgProps>
+              </a:ext>
+              <a:ext uri="{28A0092B-C50C-407E-A947-70E740481C1C}">
+                <a14:useLocalDpi xmlns:a14="http://schemas.microsoft.com/office/drawing/2010/main" val="0"/>
+              </a:ext>
+            </a:extLst>
+          </a:blip>
+          <a:srcRect l="7695" t="58082" r="64066" b="6850"/>
+          <a:stretch/>
+        </p:blipFill>
+        <p:spPr>
+          <a:xfrm>
+            <a:off x="-32783" y="4454444"/>
+            <a:ext cx="843418" cy="920092"/>
+          </a:xfrm>
+          <a:prstGeom prst="rect">
+            <a:avLst/>
+          </a:prstGeom>
+        </p:spPr>
+      </p:pic>
+      <p:sp>
+        <p:nvSpPr>
+          <p:cNvPr id="6" name="Retângulo 5">
+            <a:extLst>
+              <a:ext uri="{FF2B5EF4-FFF2-40B4-BE49-F238E27FC236}">
+                <a16:creationId xmlns:a16="http://schemas.microsoft.com/office/drawing/2014/main" id="{248E7E33-DE96-4D92-92C1-43096524296C}"/>
+              </a:ext>
+            </a:extLst>
+          </p:cNvPr>
+          <p:cNvSpPr/>
+          <p:nvPr/>
+        </p:nvSpPr>
+        <p:spPr>
+          <a:xfrm>
+            <a:off x="1060313" y="554475"/>
+            <a:ext cx="2743200" cy="321013"/>
+          </a:xfrm>
+          <a:prstGeom prst="rect">
+            <a:avLst/>
+          </a:prstGeom>
+          <a:solidFill>
+            <a:schemeClr val="bg1"/>
+          </a:solidFill>
+        </p:spPr>
+        <p:style>
+          <a:lnRef idx="2">
+            <a:schemeClr val="accent1">
+              <a:shade val="50000"/>
+            </a:schemeClr>
+          </a:lnRef>
+          <a:fillRef idx="1">
+            <a:schemeClr val="accent1"/>
+          </a:fillRef>
+          <a:effectRef idx="0">
+            <a:schemeClr val="accent1"/>
+          </a:effectRef>
+          <a:fontRef idx="minor">
+            <a:schemeClr val="lt1"/>
+          </a:fontRef>
+        </p:style>
+        <p:txBody>
+          <a:bodyPr rtlCol="0" anchor="ctr"/>
+          <a:lstStyle/>
+          <a:p>
+            <a:pPr algn="ctr"/>
+            <a:r>
+              <a:rPr lang="pt-BR" dirty="0">
+                <a:solidFill>
+                  <a:schemeClr val="tx1"/>
+                </a:solidFill>
+              </a:rPr>
+              <a:t>Ponto Nível 1</a:t>
+            </a:r>
+          </a:p>
+        </p:txBody>
+      </p:sp>
+      <p:sp>
+        <p:nvSpPr>
+          <p:cNvPr id="7" name="Retângulo 6">
+            <a:extLst>
+              <a:ext uri="{FF2B5EF4-FFF2-40B4-BE49-F238E27FC236}">
+                <a16:creationId xmlns:a16="http://schemas.microsoft.com/office/drawing/2014/main" id="{11B7D827-9426-42CA-8480-FF03FC6CE877}"/>
+              </a:ext>
+            </a:extLst>
+          </p:cNvPr>
+          <p:cNvSpPr/>
+          <p:nvPr/>
+        </p:nvSpPr>
+        <p:spPr>
+          <a:xfrm>
+            <a:off x="1060313" y="1079769"/>
+            <a:ext cx="2743200" cy="321013"/>
+          </a:xfrm>
+          <a:prstGeom prst="rect">
+            <a:avLst/>
+          </a:prstGeom>
+          <a:solidFill>
+            <a:schemeClr val="bg1"/>
+          </a:solidFill>
+        </p:spPr>
+        <p:style>
+          <a:lnRef idx="2">
+            <a:schemeClr val="accent1">
+              <a:shade val="50000"/>
+            </a:schemeClr>
+          </a:lnRef>
+          <a:fillRef idx="1">
+            <a:schemeClr val="accent1"/>
+          </a:fillRef>
+          <a:effectRef idx="0">
+            <a:schemeClr val="accent1"/>
+          </a:effectRef>
+          <a:fontRef idx="minor">
+            <a:schemeClr val="lt1"/>
+          </a:fontRef>
+        </p:style>
+        <p:txBody>
+          <a:bodyPr rtlCol="0" anchor="ctr"/>
+          <a:lstStyle/>
+          <a:p>
+            <a:pPr algn="ctr"/>
+            <a:r>
+              <a:rPr lang="pt-BR" dirty="0">
+                <a:solidFill>
+                  <a:schemeClr val="tx1"/>
+                </a:solidFill>
+              </a:rPr>
+              <a:t>Ponto Nível 1</a:t>
+            </a:r>
+          </a:p>
+        </p:txBody>
+      </p:sp>
+      <p:sp>
+        <p:nvSpPr>
+          <p:cNvPr id="8" name="Retângulo 7">
+            <a:extLst>
+              <a:ext uri="{FF2B5EF4-FFF2-40B4-BE49-F238E27FC236}">
+                <a16:creationId xmlns:a16="http://schemas.microsoft.com/office/drawing/2014/main" id="{0DF121C0-6A9C-44DA-9EFE-0BF96C5AC7AD}"/>
+              </a:ext>
+            </a:extLst>
+          </p:cNvPr>
+          <p:cNvSpPr/>
+          <p:nvPr/>
+        </p:nvSpPr>
+        <p:spPr>
+          <a:xfrm>
+            <a:off x="1060313" y="5364810"/>
+            <a:ext cx="2743200" cy="321013"/>
+          </a:xfrm>
+          <a:prstGeom prst="rect">
+            <a:avLst/>
+          </a:prstGeom>
+          <a:solidFill>
+            <a:schemeClr val="bg1"/>
+          </a:solidFill>
+        </p:spPr>
+        <p:style>
+          <a:lnRef idx="2">
+            <a:schemeClr val="accent1">
+              <a:shade val="50000"/>
+            </a:schemeClr>
+          </a:lnRef>
+          <a:fillRef idx="1">
+            <a:schemeClr val="accent1"/>
+          </a:fillRef>
+          <a:effectRef idx="0">
+            <a:schemeClr val="accent1"/>
+          </a:effectRef>
+          <a:fontRef idx="minor">
+            <a:schemeClr val="lt1"/>
+          </a:fontRef>
+        </p:style>
+        <p:txBody>
+          <a:bodyPr rtlCol="0" anchor="ctr"/>
+          <a:lstStyle/>
+          <a:p>
+            <a:pPr algn="ctr"/>
+            <a:r>
+              <a:rPr lang="pt-BR" dirty="0">
+                <a:solidFill>
+                  <a:schemeClr val="tx1"/>
+                </a:solidFill>
+              </a:rPr>
+              <a:t>Ponto Nível 1</a:t>
+            </a:r>
+          </a:p>
+        </p:txBody>
+      </p:sp>
+      <p:sp>
+        <p:nvSpPr>
+          <p:cNvPr id="9" name="Retângulo 8">
+            <a:extLst>
+              <a:ext uri="{FF2B5EF4-FFF2-40B4-BE49-F238E27FC236}">
+                <a16:creationId xmlns:a16="http://schemas.microsoft.com/office/drawing/2014/main" id="{D509ADCB-EFA0-4C32-9D3C-5933F38D6B7B}"/>
+              </a:ext>
+            </a:extLst>
+          </p:cNvPr>
+          <p:cNvSpPr/>
+          <p:nvPr/>
+        </p:nvSpPr>
+        <p:spPr>
+          <a:xfrm>
+            <a:off x="3803513" y="2130357"/>
+            <a:ext cx="2743200" cy="321013"/>
+          </a:xfrm>
+          <a:prstGeom prst="rect">
+            <a:avLst/>
+          </a:prstGeom>
+          <a:solidFill>
+            <a:schemeClr val="bg1"/>
+          </a:solidFill>
+        </p:spPr>
+        <p:style>
+          <a:lnRef idx="2">
+            <a:schemeClr val="accent1">
+              <a:shade val="50000"/>
+            </a:schemeClr>
+          </a:lnRef>
+          <a:fillRef idx="1">
+            <a:schemeClr val="accent1"/>
+          </a:fillRef>
+          <a:effectRef idx="0">
+            <a:schemeClr val="accent1"/>
+          </a:effectRef>
+          <a:fontRef idx="minor">
+            <a:schemeClr val="lt1"/>
+          </a:fontRef>
+        </p:style>
+        <p:txBody>
+          <a:bodyPr rtlCol="0" anchor="ctr"/>
+          <a:lstStyle/>
+          <a:p>
+            <a:pPr algn="ctr"/>
+            <a:r>
+              <a:rPr lang="pt-BR" dirty="0">
+                <a:solidFill>
+                  <a:schemeClr val="tx1"/>
+                </a:solidFill>
+              </a:rPr>
+              <a:t>Ponto Nível 2</a:t>
+            </a:r>
+          </a:p>
+        </p:txBody>
+      </p:sp>
+      <p:sp>
+        <p:nvSpPr>
+          <p:cNvPr id="10" name="Retângulo 9">
+            <a:extLst>
+              <a:ext uri="{FF2B5EF4-FFF2-40B4-BE49-F238E27FC236}">
+                <a16:creationId xmlns:a16="http://schemas.microsoft.com/office/drawing/2014/main" id="{06BE1534-9CA6-4D62-B8BD-36105F287AB0}"/>
+              </a:ext>
+            </a:extLst>
+          </p:cNvPr>
+          <p:cNvSpPr/>
+          <p:nvPr/>
+        </p:nvSpPr>
+        <p:spPr>
+          <a:xfrm>
+            <a:off x="3803513" y="2655651"/>
+            <a:ext cx="2743200" cy="321013"/>
+          </a:xfrm>
+          <a:prstGeom prst="rect">
+            <a:avLst/>
+          </a:prstGeom>
+          <a:solidFill>
+            <a:schemeClr val="bg1"/>
+          </a:solidFill>
+        </p:spPr>
+        <p:style>
+          <a:lnRef idx="2">
+            <a:schemeClr val="accent1">
+              <a:shade val="50000"/>
+            </a:schemeClr>
+          </a:lnRef>
+          <a:fillRef idx="1">
+            <a:schemeClr val="accent1"/>
+          </a:fillRef>
+          <a:effectRef idx="0">
+            <a:schemeClr val="accent1"/>
+          </a:effectRef>
+          <a:fontRef idx="minor">
+            <a:schemeClr val="lt1"/>
+          </a:fontRef>
+        </p:style>
+        <p:txBody>
+          <a:bodyPr rtlCol="0" anchor="ctr"/>
+          <a:lstStyle/>
+          <a:p>
+            <a:pPr algn="ctr"/>
+            <a:r>
+              <a:rPr lang="pt-BR" dirty="0">
+                <a:solidFill>
+                  <a:schemeClr val="tx1"/>
+                </a:solidFill>
+              </a:rPr>
+              <a:t>Ponto Nível 2</a:t>
+            </a:r>
+          </a:p>
+        </p:txBody>
+      </p:sp>
+      <p:sp>
+        <p:nvSpPr>
+          <p:cNvPr id="11" name="Retângulo 10">
+            <a:extLst>
+              <a:ext uri="{FF2B5EF4-FFF2-40B4-BE49-F238E27FC236}">
+                <a16:creationId xmlns:a16="http://schemas.microsoft.com/office/drawing/2014/main" id="{8A65CAAA-9BAE-49E2-9AA3-FE410757B2AA}"/>
+              </a:ext>
+            </a:extLst>
+          </p:cNvPr>
+          <p:cNvSpPr/>
+          <p:nvPr/>
+        </p:nvSpPr>
+        <p:spPr>
+          <a:xfrm>
+            <a:off x="3803513" y="3205264"/>
+            <a:ext cx="2743200" cy="321013"/>
+          </a:xfrm>
+          <a:prstGeom prst="rect">
+            <a:avLst/>
+          </a:prstGeom>
+          <a:solidFill>
+            <a:schemeClr val="bg1"/>
+          </a:solidFill>
+        </p:spPr>
+        <p:style>
+          <a:lnRef idx="2">
+            <a:schemeClr val="accent1">
+              <a:shade val="50000"/>
+            </a:schemeClr>
+          </a:lnRef>
+          <a:fillRef idx="1">
+            <a:schemeClr val="accent1"/>
+          </a:fillRef>
+          <a:effectRef idx="0">
+            <a:schemeClr val="accent1"/>
+          </a:effectRef>
+          <a:fontRef idx="minor">
+            <a:schemeClr val="lt1"/>
+          </a:fontRef>
+        </p:style>
+        <p:txBody>
+          <a:bodyPr rtlCol="0" anchor="ctr"/>
+          <a:lstStyle/>
+          <a:p>
+            <a:pPr algn="ctr"/>
+            <a:r>
+              <a:rPr lang="pt-BR" dirty="0">
+                <a:solidFill>
+                  <a:schemeClr val="tx1"/>
+                </a:solidFill>
+              </a:rPr>
+              <a:t>Ponto Nível 2</a:t>
+            </a:r>
+          </a:p>
+        </p:txBody>
+      </p:sp>
+      <p:sp>
+        <p:nvSpPr>
+          <p:cNvPr id="12" name="Retângulo 11">
+            <a:extLst>
+              <a:ext uri="{FF2B5EF4-FFF2-40B4-BE49-F238E27FC236}">
+                <a16:creationId xmlns:a16="http://schemas.microsoft.com/office/drawing/2014/main" id="{EC585B56-1E9F-43D8-9F12-4CC84DD53B36}"/>
+              </a:ext>
+            </a:extLst>
+          </p:cNvPr>
+          <p:cNvSpPr/>
+          <p:nvPr/>
+        </p:nvSpPr>
+        <p:spPr>
+          <a:xfrm>
+            <a:off x="3803513" y="3735422"/>
+            <a:ext cx="2743200" cy="321013"/>
+          </a:xfrm>
+          <a:prstGeom prst="rect">
+            <a:avLst/>
+          </a:prstGeom>
+          <a:solidFill>
+            <a:schemeClr val="bg1"/>
+          </a:solidFill>
+        </p:spPr>
+        <p:style>
+          <a:lnRef idx="2">
+            <a:schemeClr val="accent1">
+              <a:shade val="50000"/>
+            </a:schemeClr>
+          </a:lnRef>
+          <a:fillRef idx="1">
+            <a:schemeClr val="accent1"/>
+          </a:fillRef>
+          <a:effectRef idx="0">
+            <a:schemeClr val="accent1"/>
+          </a:effectRef>
+          <a:fontRef idx="minor">
+            <a:schemeClr val="lt1"/>
+          </a:fontRef>
+        </p:style>
+        <p:txBody>
+          <a:bodyPr rtlCol="0" anchor="ctr"/>
+          <a:lstStyle/>
+          <a:p>
+            <a:pPr algn="ctr"/>
+            <a:r>
+              <a:rPr lang="pt-BR" dirty="0">
+                <a:solidFill>
+                  <a:schemeClr val="tx1"/>
+                </a:solidFill>
+              </a:rPr>
+              <a:t>Ponto Nível 2</a:t>
+            </a:r>
+          </a:p>
+        </p:txBody>
+      </p:sp>
+      <p:sp>
+        <p:nvSpPr>
+          <p:cNvPr id="13" name="Retângulo 12">
+            <a:extLst>
+              <a:ext uri="{FF2B5EF4-FFF2-40B4-BE49-F238E27FC236}">
+                <a16:creationId xmlns:a16="http://schemas.microsoft.com/office/drawing/2014/main" id="{65EE3442-49CC-4E83-85AD-A539591D1A26}"/>
+              </a:ext>
+            </a:extLst>
+          </p:cNvPr>
+          <p:cNvSpPr/>
+          <p:nvPr/>
+        </p:nvSpPr>
+        <p:spPr>
+          <a:xfrm>
+            <a:off x="6546713" y="4265580"/>
+            <a:ext cx="2743200" cy="321013"/>
+          </a:xfrm>
+          <a:prstGeom prst="rect">
+            <a:avLst/>
+          </a:prstGeom>
+          <a:solidFill>
+            <a:schemeClr val="bg1"/>
+          </a:solidFill>
+        </p:spPr>
+        <p:style>
+          <a:lnRef idx="2">
+            <a:schemeClr val="accent1">
+              <a:shade val="50000"/>
+            </a:schemeClr>
+          </a:lnRef>
+          <a:fillRef idx="1">
+            <a:schemeClr val="accent1"/>
+          </a:fillRef>
+          <a:effectRef idx="0">
+            <a:schemeClr val="accent1"/>
+          </a:effectRef>
+          <a:fontRef idx="minor">
+            <a:schemeClr val="lt1"/>
+          </a:fontRef>
+        </p:style>
+        <p:txBody>
+          <a:bodyPr rtlCol="0" anchor="ctr"/>
+          <a:lstStyle/>
+          <a:p>
+            <a:pPr algn="ctr"/>
+            <a:r>
+              <a:rPr lang="pt-BR" dirty="0">
+                <a:solidFill>
+                  <a:schemeClr val="tx1"/>
+                </a:solidFill>
+              </a:rPr>
+              <a:t>Ponto Nível 3</a:t>
+            </a:r>
+          </a:p>
+        </p:txBody>
+      </p:sp>
+      <p:sp>
+        <p:nvSpPr>
+          <p:cNvPr id="14" name="Retângulo 13">
+            <a:extLst>
+              <a:ext uri="{FF2B5EF4-FFF2-40B4-BE49-F238E27FC236}">
+                <a16:creationId xmlns:a16="http://schemas.microsoft.com/office/drawing/2014/main" id="{19E07779-76D1-4797-A084-4FC5B5454FA8}"/>
+              </a:ext>
+            </a:extLst>
+          </p:cNvPr>
+          <p:cNvSpPr/>
+          <p:nvPr/>
+        </p:nvSpPr>
+        <p:spPr>
+          <a:xfrm>
+            <a:off x="3803513" y="4815193"/>
+            <a:ext cx="2743200" cy="321013"/>
+          </a:xfrm>
+          <a:prstGeom prst="rect">
+            <a:avLst/>
+          </a:prstGeom>
+          <a:solidFill>
+            <a:schemeClr val="bg1"/>
+          </a:solidFill>
+        </p:spPr>
+        <p:style>
+          <a:lnRef idx="2">
+            <a:schemeClr val="accent1">
+              <a:shade val="50000"/>
+            </a:schemeClr>
+          </a:lnRef>
+          <a:fillRef idx="1">
+            <a:schemeClr val="accent1"/>
+          </a:fillRef>
+          <a:effectRef idx="0">
+            <a:schemeClr val="accent1"/>
+          </a:effectRef>
+          <a:fontRef idx="minor">
+            <a:schemeClr val="lt1"/>
+          </a:fontRef>
+        </p:style>
+        <p:txBody>
+          <a:bodyPr rtlCol="0" anchor="ctr"/>
+          <a:lstStyle/>
+          <a:p>
+            <a:pPr algn="ctr"/>
+            <a:r>
+              <a:rPr lang="pt-BR" dirty="0">
+                <a:solidFill>
+                  <a:schemeClr val="tx1"/>
+                </a:solidFill>
+              </a:rPr>
+              <a:t>Ponto Nível 2</a:t>
+            </a:r>
+          </a:p>
+        </p:txBody>
+      </p:sp>
+      <p:sp>
+        <p:nvSpPr>
+          <p:cNvPr id="15" name="Retângulo 14">
+            <a:extLst>
+              <a:ext uri="{FF2B5EF4-FFF2-40B4-BE49-F238E27FC236}">
+                <a16:creationId xmlns:a16="http://schemas.microsoft.com/office/drawing/2014/main" id="{46EF3FB4-B626-4F59-BC66-B5588D2B04B1}"/>
+              </a:ext>
+            </a:extLst>
+          </p:cNvPr>
+          <p:cNvSpPr/>
+          <p:nvPr/>
+        </p:nvSpPr>
+        <p:spPr>
+          <a:xfrm>
+            <a:off x="1060313" y="5890104"/>
+            <a:ext cx="2743200" cy="321013"/>
+          </a:xfrm>
+          <a:prstGeom prst="rect">
+            <a:avLst/>
+          </a:prstGeom>
+          <a:solidFill>
+            <a:schemeClr val="bg1"/>
+          </a:solidFill>
+        </p:spPr>
+        <p:style>
+          <a:lnRef idx="2">
+            <a:schemeClr val="accent1">
+              <a:shade val="50000"/>
+            </a:schemeClr>
+          </a:lnRef>
+          <a:fillRef idx="1">
+            <a:schemeClr val="accent1"/>
+          </a:fillRef>
+          <a:effectRef idx="0">
+            <a:schemeClr val="accent1"/>
+          </a:effectRef>
+          <a:fontRef idx="minor">
+            <a:schemeClr val="lt1"/>
+          </a:fontRef>
+        </p:style>
+        <p:txBody>
+          <a:bodyPr rtlCol="0" anchor="ctr"/>
+          <a:lstStyle/>
+          <a:p>
+            <a:pPr algn="ctr"/>
+            <a:r>
+              <a:rPr lang="pt-BR" dirty="0">
+                <a:solidFill>
+                  <a:schemeClr val="tx1"/>
+                </a:solidFill>
+              </a:rPr>
+              <a:t>Ponto Nível 1</a:t>
+            </a:r>
+          </a:p>
+        </p:txBody>
+      </p:sp>
+      <p:sp>
+        <p:nvSpPr>
+          <p:cNvPr id="16" name="Retângulo 15">
+            <a:extLst>
+              <a:ext uri="{FF2B5EF4-FFF2-40B4-BE49-F238E27FC236}">
+                <a16:creationId xmlns:a16="http://schemas.microsoft.com/office/drawing/2014/main" id="{089B66EB-FB7B-474A-8D69-0F06178AAA34}"/>
+              </a:ext>
+            </a:extLst>
+          </p:cNvPr>
+          <p:cNvSpPr/>
+          <p:nvPr/>
+        </p:nvSpPr>
+        <p:spPr>
+          <a:xfrm>
+            <a:off x="1060313" y="1629382"/>
+            <a:ext cx="2743200" cy="321013"/>
+          </a:xfrm>
+          <a:prstGeom prst="rect">
+            <a:avLst/>
+          </a:prstGeom>
+          <a:solidFill>
+            <a:schemeClr val="bg1"/>
+          </a:solidFill>
+        </p:spPr>
+        <p:style>
+          <a:lnRef idx="2">
+            <a:schemeClr val="accent1">
+              <a:shade val="50000"/>
+            </a:schemeClr>
+          </a:lnRef>
+          <a:fillRef idx="1">
+            <a:schemeClr val="accent1"/>
+          </a:fillRef>
+          <a:effectRef idx="0">
+            <a:schemeClr val="accent1"/>
+          </a:effectRef>
+          <a:fontRef idx="minor">
+            <a:schemeClr val="lt1"/>
+          </a:fontRef>
+        </p:style>
+        <p:txBody>
+          <a:bodyPr rtlCol="0" anchor="ctr"/>
+          <a:lstStyle/>
+          <a:p>
+            <a:pPr algn="ctr"/>
+            <a:r>
+              <a:rPr lang="pt-BR" dirty="0">
+                <a:solidFill>
+                  <a:schemeClr val="tx1"/>
+                </a:solidFill>
+              </a:rPr>
+              <a:t>Ponto Nível 1</a:t>
+            </a:r>
+          </a:p>
+        </p:txBody>
+      </p:sp>
+      <p:sp>
+        <p:nvSpPr>
+          <p:cNvPr id="17" name="Chave Direita 16">
+            <a:extLst>
+              <a:ext uri="{FF2B5EF4-FFF2-40B4-BE49-F238E27FC236}">
+                <a16:creationId xmlns:a16="http://schemas.microsoft.com/office/drawing/2014/main" id="{F68768EC-D3C2-418E-83B1-D4601409A008}"/>
+              </a:ext>
+            </a:extLst>
+          </p:cNvPr>
+          <p:cNvSpPr/>
+          <p:nvPr/>
+        </p:nvSpPr>
+        <p:spPr>
+          <a:xfrm>
+            <a:off x="6796391" y="1629382"/>
+            <a:ext cx="249680" cy="821988"/>
+          </a:xfrm>
+          <a:prstGeom prst="rightBrace">
+            <a:avLst/>
+          </a:prstGeom>
+        </p:spPr>
+        <p:style>
+          <a:lnRef idx="1">
+            <a:schemeClr val="accent1"/>
+          </a:lnRef>
+          <a:fillRef idx="0">
+            <a:schemeClr val="accent1"/>
+          </a:fillRef>
+          <a:effectRef idx="0">
+            <a:schemeClr val="accent1"/>
+          </a:effectRef>
+          <a:fontRef idx="minor">
+            <a:schemeClr val="tx1"/>
+          </a:fontRef>
+        </p:style>
+        <p:txBody>
+          <a:bodyPr rtlCol="0" anchor="ctr"/>
+          <a:lstStyle/>
+          <a:p>
+            <a:pPr algn="ctr"/>
+            <a:endParaRPr lang="pt-BR"/>
+          </a:p>
+        </p:txBody>
+      </p:sp>
+      <p:sp>
+        <p:nvSpPr>
+          <p:cNvPr id="18" name="Chave Direita 17">
+            <a:extLst>
+              <a:ext uri="{FF2B5EF4-FFF2-40B4-BE49-F238E27FC236}">
+                <a16:creationId xmlns:a16="http://schemas.microsoft.com/office/drawing/2014/main" id="{2E39BDCA-835E-4035-882A-C08316A354DB}"/>
+              </a:ext>
+            </a:extLst>
+          </p:cNvPr>
+          <p:cNvSpPr/>
+          <p:nvPr/>
+        </p:nvSpPr>
+        <p:spPr>
+          <a:xfrm>
+            <a:off x="9430965" y="3830267"/>
+            <a:ext cx="282105" cy="870626"/>
+          </a:xfrm>
+          <a:prstGeom prst="rightBrace">
+            <a:avLst/>
+          </a:prstGeom>
+        </p:spPr>
+        <p:style>
+          <a:lnRef idx="1">
+            <a:schemeClr val="accent1"/>
+          </a:lnRef>
+          <a:fillRef idx="0">
+            <a:schemeClr val="accent1"/>
+          </a:fillRef>
+          <a:effectRef idx="0">
+            <a:schemeClr val="accent1"/>
+          </a:effectRef>
+          <a:fontRef idx="minor">
+            <a:schemeClr val="tx1"/>
+          </a:fontRef>
+        </p:style>
+        <p:txBody>
+          <a:bodyPr rtlCol="0" anchor="ctr"/>
+          <a:lstStyle/>
+          <a:p>
+            <a:pPr algn="ctr"/>
+            <a:endParaRPr lang="pt-BR"/>
+          </a:p>
+        </p:txBody>
+      </p:sp>
+      <p:sp>
+        <p:nvSpPr>
+          <p:cNvPr id="19" name="Chave Direita 18">
+            <a:extLst>
+              <a:ext uri="{FF2B5EF4-FFF2-40B4-BE49-F238E27FC236}">
+                <a16:creationId xmlns:a16="http://schemas.microsoft.com/office/drawing/2014/main" id="{BB6D3F44-66B4-4098-BF94-86D313F78DAD}"/>
+              </a:ext>
+            </a:extLst>
+          </p:cNvPr>
+          <p:cNvSpPr/>
+          <p:nvPr/>
+        </p:nvSpPr>
+        <p:spPr>
+          <a:xfrm>
+            <a:off x="6796391" y="4815193"/>
+            <a:ext cx="282105" cy="870630"/>
+          </a:xfrm>
+          <a:prstGeom prst="rightBrace">
+            <a:avLst/>
+          </a:prstGeom>
+        </p:spPr>
+        <p:style>
+          <a:lnRef idx="1">
+            <a:schemeClr val="accent1"/>
+          </a:lnRef>
+          <a:fillRef idx="0">
+            <a:schemeClr val="accent1"/>
+          </a:fillRef>
+          <a:effectRef idx="0">
+            <a:schemeClr val="accent1"/>
+          </a:effectRef>
+          <a:fontRef idx="minor">
+            <a:schemeClr val="tx1"/>
+          </a:fontRef>
+        </p:style>
+        <p:txBody>
+          <a:bodyPr rtlCol="0" anchor="ctr"/>
+          <a:lstStyle/>
+          <a:p>
+            <a:pPr algn="ctr"/>
+            <a:endParaRPr lang="pt-BR"/>
+          </a:p>
+        </p:txBody>
+      </p:sp>
+      <p:sp>
+        <p:nvSpPr>
+          <p:cNvPr id="20" name="CaixaDeTexto 19">
+            <a:extLst>
+              <a:ext uri="{FF2B5EF4-FFF2-40B4-BE49-F238E27FC236}">
+                <a16:creationId xmlns:a16="http://schemas.microsoft.com/office/drawing/2014/main" id="{271938EE-A7E2-4D2E-9B15-AEE3B559F085}"/>
+              </a:ext>
+            </a:extLst>
+          </p:cNvPr>
+          <p:cNvSpPr txBox="1"/>
+          <p:nvPr/>
+        </p:nvSpPr>
+        <p:spPr>
+          <a:xfrm>
+            <a:off x="7208196" y="1855710"/>
+            <a:ext cx="1959832" cy="369332"/>
+          </a:xfrm>
+          <a:prstGeom prst="rect">
+            <a:avLst/>
+          </a:prstGeom>
+          <a:noFill/>
+        </p:spPr>
+        <p:txBody>
+          <a:bodyPr wrap="none" rtlCol="0">
+            <a:spAutoFit/>
+          </a:bodyPr>
+          <a:lstStyle/>
+          <a:p>
+            <a:r>
+              <a:rPr lang="pt-BR" dirty="0"/>
+              <a:t>Ponto de decisão 1</a:t>
+            </a:r>
+          </a:p>
+        </p:txBody>
+      </p:sp>
+      <p:sp>
+        <p:nvSpPr>
+          <p:cNvPr id="21" name="CaixaDeTexto 20">
+            <a:extLst>
+              <a:ext uri="{FF2B5EF4-FFF2-40B4-BE49-F238E27FC236}">
+                <a16:creationId xmlns:a16="http://schemas.microsoft.com/office/drawing/2014/main" id="{7997D335-DCDC-4ED7-B2F8-34E6E2D81BDA}"/>
+              </a:ext>
+            </a:extLst>
+          </p:cNvPr>
+          <p:cNvSpPr txBox="1"/>
+          <p:nvPr/>
+        </p:nvSpPr>
+        <p:spPr>
+          <a:xfrm>
+            <a:off x="9854122" y="4056435"/>
+            <a:ext cx="1959832" cy="369332"/>
+          </a:xfrm>
+          <a:prstGeom prst="rect">
+            <a:avLst/>
+          </a:prstGeom>
+          <a:noFill/>
+        </p:spPr>
+        <p:txBody>
+          <a:bodyPr wrap="none" rtlCol="0">
+            <a:spAutoFit/>
+          </a:bodyPr>
+          <a:lstStyle/>
+          <a:p>
+            <a:r>
+              <a:rPr lang="pt-BR" dirty="0"/>
+              <a:t>Ponto de decisão 2</a:t>
+            </a:r>
+          </a:p>
+        </p:txBody>
+      </p:sp>
+      <p:cxnSp>
+        <p:nvCxnSpPr>
+          <p:cNvPr id="23" name="Conector de Seta Reta 22">
+            <a:extLst>
+              <a:ext uri="{FF2B5EF4-FFF2-40B4-BE49-F238E27FC236}">
+                <a16:creationId xmlns:a16="http://schemas.microsoft.com/office/drawing/2014/main" id="{B498C5CB-FF7E-4473-A1A2-49658EE3385B}"/>
+              </a:ext>
+            </a:extLst>
+          </p:cNvPr>
+          <p:cNvCxnSpPr/>
+          <p:nvPr/>
+        </p:nvCxnSpPr>
+        <p:spPr>
+          <a:xfrm>
+            <a:off x="846307" y="656618"/>
+            <a:ext cx="0" cy="5408579"/>
+          </a:xfrm>
+          <a:prstGeom prst="straightConnector1">
+            <a:avLst/>
+          </a:prstGeom>
+          <a:ln w="34925">
+            <a:tailEnd type="triangle"/>
+          </a:ln>
+        </p:spPr>
+        <p:style>
+          <a:lnRef idx="1">
+            <a:schemeClr val="accent1"/>
+          </a:lnRef>
+          <a:fillRef idx="0">
+            <a:schemeClr val="accent1"/>
+          </a:fillRef>
+          <a:effectRef idx="0">
+            <a:schemeClr val="accent1"/>
+          </a:effectRef>
+          <a:fontRef idx="minor">
+            <a:schemeClr val="tx1"/>
+          </a:fontRef>
+        </p:style>
+      </p:cxnSp>
+      <p:sp>
+        <p:nvSpPr>
+          <p:cNvPr id="24" name="CaixaDeTexto 23">
+            <a:extLst>
+              <a:ext uri="{FF2B5EF4-FFF2-40B4-BE49-F238E27FC236}">
+                <a16:creationId xmlns:a16="http://schemas.microsoft.com/office/drawing/2014/main" id="{897947E2-244F-4C15-93EF-60CACB9A172F}"/>
+              </a:ext>
+            </a:extLst>
+          </p:cNvPr>
+          <p:cNvSpPr txBox="1"/>
+          <p:nvPr/>
+        </p:nvSpPr>
+        <p:spPr>
+          <a:xfrm rot="16200000">
+            <a:off x="-798255" y="3036065"/>
+            <a:ext cx="2694561" cy="523220"/>
+          </a:xfrm>
+          <a:prstGeom prst="rect">
+            <a:avLst/>
+          </a:prstGeom>
+          <a:noFill/>
+        </p:spPr>
+        <p:txBody>
+          <a:bodyPr wrap="square" rtlCol="0">
+            <a:spAutoFit/>
+          </a:bodyPr>
+          <a:lstStyle/>
+          <a:p>
+            <a:r>
+              <a:rPr lang="pt-BR" sz="2800" dirty="0"/>
+              <a:t>Execução da rota</a:t>
+            </a:r>
+          </a:p>
+        </p:txBody>
+      </p:sp>
+    </p:spTree>
+    <p:extLst>
+      <p:ext uri="{BB962C8B-B14F-4D97-AF65-F5344CB8AC3E}">
+        <p14:creationId xmlns:p14="http://schemas.microsoft.com/office/powerpoint/2010/main" val="3605879470"/>
+      </p:ext>
+    </p:extLst>
+  </p:cSld>
+  <p:clrMapOvr>
+    <a:masterClrMapping/>
+  </p:clrMapOvr>
+</p:sld>
+</file>
+
+<file path=ppt/slides/slide9.xml><?xml version="1.0" encoding="utf-8"?>
+<p:sld xmlns:a="http://schemas.openxmlformats.org/drawingml/2006/main" xmlns:r="http://schemas.openxmlformats.org/officeDocument/2006/relationships" xmlns:p="http://schemas.openxmlformats.org/presentationml/2006/main">
+  <p:cSld>
+    <p:spTree>
+      <p:nvGrpSpPr>
+        <p:cNvPr id="1" name=""/>
+        <p:cNvGrpSpPr/>
+        <p:nvPr/>
+      </p:nvGrpSpPr>
+      <p:grpSpPr>
+        <a:xfrm>
+          <a:off x="0" y="0"/>
+          <a:ext cx="0" cy="0"/>
+          <a:chOff x="0" y="0"/>
+          <a:chExt cx="0" cy="0"/>
+        </a:xfrm>
+      </p:grpSpPr>
+      <p:pic>
+        <p:nvPicPr>
+          <p:cNvPr id="4" name="Imagem 3">
+            <a:extLst>
+              <a:ext uri="{FF2B5EF4-FFF2-40B4-BE49-F238E27FC236}">
+                <a16:creationId xmlns:a16="http://schemas.microsoft.com/office/drawing/2014/main" id="{BBD1FD5C-0EFD-49EC-BDB9-DDCA327AE449}"/>
+              </a:ext>
+            </a:extLst>
+          </p:cNvPr>
+          <p:cNvPicPr>
+            <a:picLocks noChangeAspect="1"/>
+          </p:cNvPicPr>
+          <p:nvPr/>
+        </p:nvPicPr>
+        <p:blipFill rotWithShape="1">
+          <a:blip r:embed="rId2">
+            <a:extLst>
+              <a:ext uri="{BEBA8EAE-BF5A-486C-A8C5-ECC9F3942E4B}">
+                <a14:imgProps xmlns:a14="http://schemas.microsoft.com/office/drawing/2010/main">
+                  <a14:imgLayer r:embed="rId3">
+                    <a14:imgEffect>
+                      <a14:backgroundRemoval t="61589" b="89643" l="10519" r="33110">
+                        <a14:foregroundMark x1="26923" y1="65849" x2="26923" y2="65849"/>
+                        <a14:foregroundMark x1="25231" y1="65849" x2="21077" y2="66375"/>
+                        <a14:foregroundMark x1="22308" y1="67075" x2="25692" y2="68827"/>
+                        <a14:foregroundMark x1="25692" y1="68827" x2="17538" y2="83012"/>
+                        <a14:foregroundMark x1="19077" y1="84764" x2="29231" y2="75131"/>
+                        <a14:foregroundMark x1="29231" y1="74781" x2="17538" y2="80035"/>
+                        <a14:foregroundMark x1="15231" y1="76708" x2="18462" y2="70753"/>
+                        <a14:foregroundMark x1="29538" y1="71103" x2="20769" y2="84764"/>
+                      </a14:backgroundRemoval>
+                    </a14:imgEffect>
+                  </a14:imgLayer>
+                </a14:imgProps>
+              </a:ext>
+              <a:ext uri="{28A0092B-C50C-407E-A947-70E740481C1C}">
+                <a14:useLocalDpi xmlns:a14="http://schemas.microsoft.com/office/drawing/2010/main" val="0"/>
+              </a:ext>
+            </a:extLst>
+          </a:blip>
+          <a:srcRect l="7695" t="58082" r="64066" b="6850"/>
+          <a:stretch/>
+        </p:blipFill>
+        <p:spPr>
+          <a:xfrm>
+            <a:off x="1567847" y="961783"/>
+            <a:ext cx="843418" cy="920092"/>
+          </a:xfrm>
+          <a:prstGeom prst="rect">
+            <a:avLst/>
+          </a:prstGeom>
+        </p:spPr>
+      </p:pic>
+      <p:sp>
+        <p:nvSpPr>
+          <p:cNvPr id="5" name="Elipse 4">
+            <a:extLst>
+              <a:ext uri="{FF2B5EF4-FFF2-40B4-BE49-F238E27FC236}">
+                <a16:creationId xmlns:a16="http://schemas.microsoft.com/office/drawing/2014/main" id="{44609F4A-B80B-4A10-BC73-77151C78FB9A}"/>
+              </a:ext>
+            </a:extLst>
+          </p:cNvPr>
+          <p:cNvSpPr/>
+          <p:nvPr/>
+        </p:nvSpPr>
+        <p:spPr>
+          <a:xfrm>
+            <a:off x="1726910" y="1762711"/>
+            <a:ext cx="525293" cy="476656"/>
+          </a:xfrm>
+          <a:prstGeom prst="ellipse">
+            <a:avLst/>
+          </a:prstGeom>
+        </p:spPr>
+        <p:style>
+          <a:lnRef idx="2">
+            <a:schemeClr val="accent1">
+              <a:shade val="50000"/>
+            </a:schemeClr>
+          </a:lnRef>
+          <a:fillRef idx="1">
+            <a:schemeClr val="accent1"/>
+          </a:fillRef>
+          <a:effectRef idx="0">
+            <a:schemeClr val="accent1"/>
+          </a:effectRef>
+          <a:fontRef idx="minor">
+            <a:schemeClr val="lt1"/>
+          </a:fontRef>
+        </p:style>
+        <p:txBody>
+          <a:bodyPr rtlCol="0" anchor="ctr"/>
+          <a:lstStyle/>
+          <a:p>
+            <a:pPr algn="ctr"/>
+            <a:r>
+              <a:rPr lang="pt-BR" dirty="0"/>
+              <a:t>1</a:t>
+            </a:r>
+          </a:p>
+        </p:txBody>
+      </p:sp>
+      <p:sp>
+        <p:nvSpPr>
+          <p:cNvPr id="6" name="Elipse 5">
+            <a:extLst>
+              <a:ext uri="{FF2B5EF4-FFF2-40B4-BE49-F238E27FC236}">
+                <a16:creationId xmlns:a16="http://schemas.microsoft.com/office/drawing/2014/main" id="{A29BBD95-92CB-406B-AB29-328A25F073CF}"/>
+              </a:ext>
+            </a:extLst>
+          </p:cNvPr>
+          <p:cNvSpPr/>
+          <p:nvPr/>
+        </p:nvSpPr>
+        <p:spPr>
+          <a:xfrm>
+            <a:off x="2990101" y="1762711"/>
+            <a:ext cx="525293" cy="476656"/>
+          </a:xfrm>
+          <a:prstGeom prst="ellipse">
+            <a:avLst/>
+          </a:prstGeom>
+        </p:spPr>
+        <p:style>
+          <a:lnRef idx="2">
+            <a:schemeClr val="accent1">
+              <a:shade val="50000"/>
+            </a:schemeClr>
+          </a:lnRef>
+          <a:fillRef idx="1">
+            <a:schemeClr val="accent1"/>
+          </a:fillRef>
+          <a:effectRef idx="0">
+            <a:schemeClr val="accent1"/>
+          </a:effectRef>
+          <a:fontRef idx="minor">
+            <a:schemeClr val="lt1"/>
+          </a:fontRef>
+        </p:style>
+        <p:txBody>
+          <a:bodyPr rtlCol="0" anchor="ctr"/>
+          <a:lstStyle/>
+          <a:p>
+            <a:pPr algn="ctr"/>
+            <a:r>
+              <a:rPr lang="pt-BR" dirty="0"/>
+              <a:t>1</a:t>
+            </a:r>
+          </a:p>
+        </p:txBody>
+      </p:sp>
+      <p:sp>
+        <p:nvSpPr>
+          <p:cNvPr id="7" name="Elipse 6">
+            <a:extLst>
+              <a:ext uri="{FF2B5EF4-FFF2-40B4-BE49-F238E27FC236}">
+                <a16:creationId xmlns:a16="http://schemas.microsoft.com/office/drawing/2014/main" id="{B1D76912-7C67-4FF4-8054-A7E3168BC295}"/>
+              </a:ext>
+            </a:extLst>
+          </p:cNvPr>
+          <p:cNvSpPr/>
+          <p:nvPr/>
+        </p:nvSpPr>
+        <p:spPr>
+          <a:xfrm>
+            <a:off x="4253292" y="1762711"/>
+            <a:ext cx="525293" cy="476656"/>
+          </a:xfrm>
+          <a:prstGeom prst="ellipse">
+            <a:avLst/>
+          </a:prstGeom>
+        </p:spPr>
+        <p:style>
+          <a:lnRef idx="2">
+            <a:schemeClr val="accent1">
+              <a:shade val="50000"/>
+            </a:schemeClr>
+          </a:lnRef>
+          <a:fillRef idx="1">
+            <a:schemeClr val="accent1"/>
+          </a:fillRef>
+          <a:effectRef idx="0">
+            <a:schemeClr val="accent1"/>
+          </a:effectRef>
+          <a:fontRef idx="minor">
+            <a:schemeClr val="lt1"/>
+          </a:fontRef>
+        </p:style>
+        <p:txBody>
+          <a:bodyPr rtlCol="0" anchor="ctr"/>
+          <a:lstStyle/>
+          <a:p>
+            <a:pPr algn="ctr"/>
+            <a:r>
+              <a:rPr lang="pt-BR" dirty="0"/>
+              <a:t>1</a:t>
+            </a:r>
+          </a:p>
+        </p:txBody>
+      </p:sp>
+      <p:sp>
+        <p:nvSpPr>
+          <p:cNvPr id="8" name="Elipse 7">
+            <a:extLst>
+              <a:ext uri="{FF2B5EF4-FFF2-40B4-BE49-F238E27FC236}">
+                <a16:creationId xmlns:a16="http://schemas.microsoft.com/office/drawing/2014/main" id="{58FE359A-35C3-4665-BBF3-AFBF021C21F9}"/>
+              </a:ext>
+            </a:extLst>
+          </p:cNvPr>
+          <p:cNvSpPr/>
+          <p:nvPr/>
+        </p:nvSpPr>
+        <p:spPr>
+          <a:xfrm>
+            <a:off x="4253291" y="3534951"/>
+            <a:ext cx="525293" cy="476656"/>
+          </a:xfrm>
+          <a:prstGeom prst="ellipse">
+            <a:avLst/>
+          </a:prstGeom>
+          <a:solidFill>
+            <a:srgbClr val="00B050"/>
+          </a:solidFill>
+        </p:spPr>
+        <p:style>
+          <a:lnRef idx="2">
+            <a:schemeClr val="accent1">
+              <a:shade val="50000"/>
+            </a:schemeClr>
+          </a:lnRef>
+          <a:fillRef idx="1">
+            <a:schemeClr val="accent1"/>
+          </a:fillRef>
+          <a:effectRef idx="0">
+            <a:schemeClr val="accent1"/>
+          </a:effectRef>
+          <a:fontRef idx="minor">
+            <a:schemeClr val="lt1"/>
+          </a:fontRef>
+        </p:style>
+        <p:txBody>
+          <a:bodyPr rtlCol="0" anchor="ctr"/>
+          <a:lstStyle/>
+          <a:p>
+            <a:pPr algn="ctr"/>
+            <a:r>
+              <a:rPr lang="pt-BR" dirty="0"/>
+              <a:t>2</a:t>
+            </a:r>
+          </a:p>
+        </p:txBody>
+      </p:sp>
+      <p:sp>
+        <p:nvSpPr>
+          <p:cNvPr id="9" name="Elipse 8">
+            <a:extLst>
+              <a:ext uri="{FF2B5EF4-FFF2-40B4-BE49-F238E27FC236}">
+                <a16:creationId xmlns:a16="http://schemas.microsoft.com/office/drawing/2014/main" id="{D5F790B0-1726-467F-9BF0-C39D6F82883A}"/>
+              </a:ext>
+            </a:extLst>
+          </p:cNvPr>
+          <p:cNvSpPr/>
+          <p:nvPr/>
+        </p:nvSpPr>
+        <p:spPr>
+          <a:xfrm>
+            <a:off x="5025957" y="3534951"/>
+            <a:ext cx="525293" cy="476656"/>
+          </a:xfrm>
+          <a:prstGeom prst="ellipse">
+            <a:avLst/>
+          </a:prstGeom>
+          <a:solidFill>
+            <a:srgbClr val="00B050"/>
+          </a:solidFill>
+        </p:spPr>
+        <p:style>
+          <a:lnRef idx="2">
+            <a:schemeClr val="accent1">
+              <a:shade val="50000"/>
+            </a:schemeClr>
+          </a:lnRef>
+          <a:fillRef idx="1">
+            <a:schemeClr val="accent1"/>
+          </a:fillRef>
+          <a:effectRef idx="0">
+            <a:schemeClr val="accent1"/>
+          </a:effectRef>
+          <a:fontRef idx="minor">
+            <a:schemeClr val="lt1"/>
+          </a:fontRef>
+        </p:style>
+        <p:txBody>
+          <a:bodyPr rtlCol="0" anchor="ctr"/>
+          <a:lstStyle/>
+          <a:p>
+            <a:pPr algn="ctr"/>
+            <a:r>
+              <a:rPr lang="pt-BR" dirty="0"/>
+              <a:t>2</a:t>
+            </a:r>
+          </a:p>
+        </p:txBody>
+      </p:sp>
+      <p:sp>
+        <p:nvSpPr>
+          <p:cNvPr id="10" name="Elipse 9">
+            <a:extLst>
+              <a:ext uri="{FF2B5EF4-FFF2-40B4-BE49-F238E27FC236}">
+                <a16:creationId xmlns:a16="http://schemas.microsoft.com/office/drawing/2014/main" id="{F50DD9DC-3026-4C07-A34E-55AACE799933}"/>
+              </a:ext>
+            </a:extLst>
+          </p:cNvPr>
+          <p:cNvSpPr/>
+          <p:nvPr/>
+        </p:nvSpPr>
+        <p:spPr>
+          <a:xfrm>
+            <a:off x="5798623" y="3532545"/>
+            <a:ext cx="525293" cy="476656"/>
+          </a:xfrm>
+          <a:prstGeom prst="ellipse">
+            <a:avLst/>
+          </a:prstGeom>
+          <a:solidFill>
+            <a:srgbClr val="00B050"/>
+          </a:solidFill>
+        </p:spPr>
+        <p:style>
+          <a:lnRef idx="2">
+            <a:schemeClr val="accent1">
+              <a:shade val="50000"/>
+            </a:schemeClr>
+          </a:lnRef>
+          <a:fillRef idx="1">
+            <a:schemeClr val="accent1"/>
+          </a:fillRef>
+          <a:effectRef idx="0">
+            <a:schemeClr val="accent1"/>
+          </a:effectRef>
+          <a:fontRef idx="minor">
+            <a:schemeClr val="lt1"/>
+          </a:fontRef>
+        </p:style>
+        <p:txBody>
+          <a:bodyPr rtlCol="0" anchor="ctr"/>
+          <a:lstStyle/>
+          <a:p>
+            <a:pPr algn="ctr"/>
+            <a:r>
+              <a:rPr lang="pt-BR" dirty="0"/>
+              <a:t>2</a:t>
+            </a:r>
+          </a:p>
+        </p:txBody>
+      </p:sp>
+      <p:sp>
+        <p:nvSpPr>
+          <p:cNvPr id="11" name="Elipse 10">
+            <a:extLst>
+              <a:ext uri="{FF2B5EF4-FFF2-40B4-BE49-F238E27FC236}">
+                <a16:creationId xmlns:a16="http://schemas.microsoft.com/office/drawing/2014/main" id="{7B58DCF8-D782-4F11-B67B-047AD53C392E}"/>
+              </a:ext>
+            </a:extLst>
+          </p:cNvPr>
+          <p:cNvSpPr/>
+          <p:nvPr/>
+        </p:nvSpPr>
+        <p:spPr>
+          <a:xfrm>
+            <a:off x="7403058" y="4801603"/>
+            <a:ext cx="525293" cy="476656"/>
+          </a:xfrm>
+          <a:prstGeom prst="ellipse">
+            <a:avLst/>
+          </a:prstGeom>
+          <a:solidFill>
+            <a:srgbClr val="7030A0"/>
+          </a:solidFill>
+        </p:spPr>
+        <p:style>
+          <a:lnRef idx="2">
+            <a:schemeClr val="accent1">
+              <a:shade val="50000"/>
+            </a:schemeClr>
+          </a:lnRef>
+          <a:fillRef idx="1">
+            <a:schemeClr val="accent1"/>
+          </a:fillRef>
+          <a:effectRef idx="0">
+            <a:schemeClr val="accent1"/>
+          </a:effectRef>
+          <a:fontRef idx="minor">
+            <a:schemeClr val="lt1"/>
+          </a:fontRef>
+        </p:style>
+        <p:txBody>
+          <a:bodyPr rtlCol="0" anchor="ctr"/>
+          <a:lstStyle/>
+          <a:p>
+            <a:pPr algn="ctr"/>
+            <a:r>
+              <a:rPr lang="pt-BR" dirty="0"/>
+              <a:t>3</a:t>
+            </a:r>
+          </a:p>
+        </p:txBody>
+      </p:sp>
+      <p:sp>
+        <p:nvSpPr>
+          <p:cNvPr id="12" name="Elipse 11">
+            <a:extLst>
+              <a:ext uri="{FF2B5EF4-FFF2-40B4-BE49-F238E27FC236}">
+                <a16:creationId xmlns:a16="http://schemas.microsoft.com/office/drawing/2014/main" id="{DEFDBADD-7C61-4B52-BBD6-8B505251F292}"/>
+              </a:ext>
+            </a:extLst>
+          </p:cNvPr>
+          <p:cNvSpPr/>
+          <p:nvPr/>
+        </p:nvSpPr>
+        <p:spPr>
+          <a:xfrm>
+            <a:off x="7799714" y="1761207"/>
+            <a:ext cx="525293" cy="476656"/>
+          </a:xfrm>
+          <a:prstGeom prst="ellipse">
+            <a:avLst/>
+          </a:prstGeom>
+        </p:spPr>
+        <p:style>
+          <a:lnRef idx="2">
+            <a:schemeClr val="accent1">
+              <a:shade val="50000"/>
+            </a:schemeClr>
+          </a:lnRef>
+          <a:fillRef idx="1">
+            <a:schemeClr val="accent1"/>
+          </a:fillRef>
+          <a:effectRef idx="0">
+            <a:schemeClr val="accent1"/>
+          </a:effectRef>
+          <a:fontRef idx="minor">
+            <a:schemeClr val="lt1"/>
+          </a:fontRef>
+        </p:style>
+        <p:txBody>
+          <a:bodyPr rtlCol="0" anchor="ctr"/>
+          <a:lstStyle/>
+          <a:p>
+            <a:pPr algn="ctr"/>
+            <a:r>
+              <a:rPr lang="pt-BR" dirty="0"/>
+              <a:t>1</a:t>
+            </a:r>
+          </a:p>
+        </p:txBody>
+      </p:sp>
+      <p:sp>
+        <p:nvSpPr>
+          <p:cNvPr id="14" name="Elipse 13">
+            <a:extLst>
+              <a:ext uri="{FF2B5EF4-FFF2-40B4-BE49-F238E27FC236}">
+                <a16:creationId xmlns:a16="http://schemas.microsoft.com/office/drawing/2014/main" id="{D56C8180-DCBE-43B7-AF21-68670C638AC1}"/>
+              </a:ext>
+            </a:extLst>
+          </p:cNvPr>
+          <p:cNvSpPr/>
+          <p:nvPr/>
+        </p:nvSpPr>
+        <p:spPr>
+          <a:xfrm>
+            <a:off x="10258208" y="1761207"/>
+            <a:ext cx="525293" cy="476656"/>
+          </a:xfrm>
+          <a:prstGeom prst="ellipse">
+            <a:avLst/>
+          </a:prstGeom>
+        </p:spPr>
+        <p:style>
+          <a:lnRef idx="2">
+            <a:schemeClr val="accent1">
+              <a:shade val="50000"/>
+            </a:schemeClr>
+          </a:lnRef>
+          <a:fillRef idx="1">
+            <a:schemeClr val="accent1"/>
+          </a:fillRef>
+          <a:effectRef idx="0">
+            <a:schemeClr val="accent1"/>
+          </a:effectRef>
+          <a:fontRef idx="minor">
+            <a:schemeClr val="lt1"/>
+          </a:fontRef>
+        </p:style>
+        <p:txBody>
+          <a:bodyPr rtlCol="0" anchor="ctr"/>
+          <a:lstStyle/>
+          <a:p>
+            <a:pPr algn="ctr"/>
+            <a:r>
+              <a:rPr lang="pt-BR" dirty="0"/>
+              <a:t>1</a:t>
+            </a:r>
+          </a:p>
+        </p:txBody>
+      </p:sp>
+      <p:cxnSp>
+        <p:nvCxnSpPr>
+          <p:cNvPr id="16" name="Conector de Seta Reta 15">
+            <a:extLst>
+              <a:ext uri="{FF2B5EF4-FFF2-40B4-BE49-F238E27FC236}">
+                <a16:creationId xmlns:a16="http://schemas.microsoft.com/office/drawing/2014/main" id="{49CC2129-79AB-4833-9B61-1AA27CB1B846}"/>
+              </a:ext>
+            </a:extLst>
+          </p:cNvPr>
+          <p:cNvCxnSpPr>
+            <a:stCxn id="5" idx="6"/>
+            <a:endCxn id="6" idx="2"/>
+          </p:cNvCxnSpPr>
+          <p:nvPr/>
+        </p:nvCxnSpPr>
+        <p:spPr>
+          <a:xfrm>
+            <a:off x="2252203" y="2001039"/>
+            <a:ext cx="737898" cy="0"/>
+          </a:xfrm>
+          <a:prstGeom prst="straightConnector1">
+            <a:avLst/>
+          </a:prstGeom>
+          <a:ln>
+            <a:tailEnd type="triangle"/>
+          </a:ln>
+        </p:spPr>
+        <p:style>
+          <a:lnRef idx="1">
+            <a:schemeClr val="accent1"/>
+          </a:lnRef>
+          <a:fillRef idx="0">
+            <a:schemeClr val="accent1"/>
+          </a:fillRef>
+          <a:effectRef idx="0">
+            <a:schemeClr val="accent1"/>
+          </a:effectRef>
+          <a:fontRef idx="minor">
+            <a:schemeClr val="tx1"/>
+          </a:fontRef>
+        </p:style>
+      </p:cxnSp>
+      <p:cxnSp>
+        <p:nvCxnSpPr>
+          <p:cNvPr id="18" name="Conector de Seta Reta 17">
+            <a:extLst>
+              <a:ext uri="{FF2B5EF4-FFF2-40B4-BE49-F238E27FC236}">
+                <a16:creationId xmlns:a16="http://schemas.microsoft.com/office/drawing/2014/main" id="{871E33FE-DFD9-43CA-83BB-44CF6D112877}"/>
+              </a:ext>
+            </a:extLst>
+          </p:cNvPr>
+          <p:cNvCxnSpPr>
+            <a:stCxn id="6" idx="6"/>
+            <a:endCxn id="7" idx="2"/>
+          </p:cNvCxnSpPr>
+          <p:nvPr/>
+        </p:nvCxnSpPr>
+        <p:spPr>
+          <a:xfrm>
+            <a:off x="3515394" y="2001039"/>
+            <a:ext cx="737898" cy="0"/>
+          </a:xfrm>
+          <a:prstGeom prst="straightConnector1">
+            <a:avLst/>
+          </a:prstGeom>
+          <a:ln>
+            <a:tailEnd type="triangle"/>
+          </a:ln>
+        </p:spPr>
+        <p:style>
+          <a:lnRef idx="1">
+            <a:schemeClr val="accent1"/>
+          </a:lnRef>
+          <a:fillRef idx="0">
+            <a:schemeClr val="accent1"/>
+          </a:fillRef>
+          <a:effectRef idx="0">
+            <a:schemeClr val="accent1"/>
+          </a:effectRef>
+          <a:fontRef idx="minor">
+            <a:schemeClr val="tx1"/>
+          </a:fontRef>
+        </p:style>
+      </p:cxnSp>
+      <p:cxnSp>
+        <p:nvCxnSpPr>
+          <p:cNvPr id="20" name="Conector de Seta Reta 19">
+            <a:extLst>
+              <a:ext uri="{FF2B5EF4-FFF2-40B4-BE49-F238E27FC236}">
+                <a16:creationId xmlns:a16="http://schemas.microsoft.com/office/drawing/2014/main" id="{6B1C890D-5C3E-44B3-B486-94DC9744A770}"/>
+              </a:ext>
+            </a:extLst>
+          </p:cNvPr>
+          <p:cNvCxnSpPr>
+            <a:stCxn id="7" idx="4"/>
+            <a:endCxn id="8" idx="0"/>
+          </p:cNvCxnSpPr>
+          <p:nvPr/>
+        </p:nvCxnSpPr>
+        <p:spPr>
+          <a:xfrm flipH="1">
+            <a:off x="4515938" y="2239367"/>
+            <a:ext cx="1" cy="1295584"/>
+          </a:xfrm>
+          <a:prstGeom prst="straightConnector1">
+            <a:avLst/>
+          </a:prstGeom>
+          <a:ln w="31750" cmpd="sng">
+            <a:prstDash val="dash"/>
+            <a:tailEnd type="triangle"/>
+          </a:ln>
+        </p:spPr>
+        <p:style>
+          <a:lnRef idx="1">
+            <a:schemeClr val="accent1"/>
+          </a:lnRef>
+          <a:fillRef idx="0">
+            <a:schemeClr val="accent1"/>
+          </a:fillRef>
+          <a:effectRef idx="0">
+            <a:schemeClr val="accent1"/>
+          </a:effectRef>
+          <a:fontRef idx="minor">
+            <a:schemeClr val="tx1"/>
+          </a:fontRef>
+        </p:style>
+      </p:cxnSp>
+      <p:cxnSp>
+        <p:nvCxnSpPr>
+          <p:cNvPr id="22" name="Conector de Seta Reta 21">
+            <a:extLst>
+              <a:ext uri="{FF2B5EF4-FFF2-40B4-BE49-F238E27FC236}">
+                <a16:creationId xmlns:a16="http://schemas.microsoft.com/office/drawing/2014/main" id="{F8B4E450-A571-4A69-9034-510CAFA6047E}"/>
+              </a:ext>
+            </a:extLst>
+          </p:cNvPr>
+          <p:cNvCxnSpPr>
+            <a:stCxn id="8" idx="6"/>
+            <a:endCxn id="9" idx="2"/>
+          </p:cNvCxnSpPr>
+          <p:nvPr/>
+        </p:nvCxnSpPr>
+        <p:spPr>
+          <a:xfrm>
+            <a:off x="4778584" y="3773279"/>
+            <a:ext cx="247373" cy="0"/>
+          </a:xfrm>
+          <a:prstGeom prst="straightConnector1">
+            <a:avLst/>
+          </a:prstGeom>
+          <a:ln>
+            <a:tailEnd type="triangle"/>
+          </a:ln>
+        </p:spPr>
+        <p:style>
+          <a:lnRef idx="1">
+            <a:schemeClr val="accent1"/>
+          </a:lnRef>
+          <a:fillRef idx="0">
+            <a:schemeClr val="accent1"/>
+          </a:fillRef>
+          <a:effectRef idx="0">
+            <a:schemeClr val="accent1"/>
+          </a:effectRef>
+          <a:fontRef idx="minor">
+            <a:schemeClr val="tx1"/>
+          </a:fontRef>
+        </p:style>
+      </p:cxnSp>
+      <p:cxnSp>
+        <p:nvCxnSpPr>
+          <p:cNvPr id="24" name="Conector de Seta Reta 23">
+            <a:extLst>
+              <a:ext uri="{FF2B5EF4-FFF2-40B4-BE49-F238E27FC236}">
+                <a16:creationId xmlns:a16="http://schemas.microsoft.com/office/drawing/2014/main" id="{2CEA8D5C-3B27-421B-AA9F-3EE27D297CFC}"/>
+              </a:ext>
+            </a:extLst>
+          </p:cNvPr>
+          <p:cNvCxnSpPr>
+            <a:stCxn id="9" idx="6"/>
+            <a:endCxn id="10" idx="2"/>
+          </p:cNvCxnSpPr>
+          <p:nvPr/>
+        </p:nvCxnSpPr>
+        <p:spPr>
+          <a:xfrm flipV="1">
+            <a:off x="5551250" y="3770873"/>
+            <a:ext cx="247373" cy="2406"/>
+          </a:xfrm>
+          <a:prstGeom prst="straightConnector1">
+            <a:avLst/>
+          </a:prstGeom>
+          <a:ln>
+            <a:tailEnd type="triangle"/>
+          </a:ln>
+        </p:spPr>
+        <p:style>
+          <a:lnRef idx="1">
+            <a:schemeClr val="accent1"/>
+          </a:lnRef>
+          <a:fillRef idx="0">
+            <a:schemeClr val="accent1"/>
+          </a:fillRef>
+          <a:effectRef idx="0">
+            <a:schemeClr val="accent1"/>
+          </a:effectRef>
+          <a:fontRef idx="minor">
+            <a:schemeClr val="tx1"/>
+          </a:fontRef>
+        </p:style>
+      </p:cxnSp>
+      <p:cxnSp>
+        <p:nvCxnSpPr>
+          <p:cNvPr id="26" name="Conector de Seta Reta 25">
+            <a:extLst>
+              <a:ext uri="{FF2B5EF4-FFF2-40B4-BE49-F238E27FC236}">
+                <a16:creationId xmlns:a16="http://schemas.microsoft.com/office/drawing/2014/main" id="{6D563F76-D2BE-4DFB-A374-ECD966E59C52}"/>
+              </a:ext>
+            </a:extLst>
+          </p:cNvPr>
+          <p:cNvCxnSpPr>
+            <a:cxnSpLocks/>
+            <a:stCxn id="10" idx="5"/>
+            <a:endCxn id="11" idx="1"/>
+          </p:cNvCxnSpPr>
+          <p:nvPr/>
+        </p:nvCxnSpPr>
+        <p:spPr>
+          <a:xfrm>
+            <a:off x="6246989" y="3939396"/>
+            <a:ext cx="1232996" cy="932012"/>
+          </a:xfrm>
+          <a:prstGeom prst="straightConnector1">
+            <a:avLst/>
+          </a:prstGeom>
+          <a:ln w="31750" cmpd="sng">
+            <a:prstDash val="dash"/>
+            <a:tailEnd type="triangle"/>
+          </a:ln>
+        </p:spPr>
+        <p:style>
+          <a:lnRef idx="1">
+            <a:schemeClr val="accent1"/>
+          </a:lnRef>
+          <a:fillRef idx="0">
+            <a:schemeClr val="accent1"/>
+          </a:fillRef>
+          <a:effectRef idx="0">
+            <a:schemeClr val="accent1"/>
+          </a:effectRef>
+          <a:fontRef idx="minor">
+            <a:schemeClr val="tx1"/>
+          </a:fontRef>
+        </p:style>
+      </p:cxnSp>
+      <p:cxnSp>
+        <p:nvCxnSpPr>
+          <p:cNvPr id="28" name="Conector de Seta Reta 27">
+            <a:extLst>
+              <a:ext uri="{FF2B5EF4-FFF2-40B4-BE49-F238E27FC236}">
+                <a16:creationId xmlns:a16="http://schemas.microsoft.com/office/drawing/2014/main" id="{43ACDF98-8B99-42CE-89D8-3B90121592F0}"/>
+              </a:ext>
+            </a:extLst>
+          </p:cNvPr>
+          <p:cNvCxnSpPr>
+            <a:stCxn id="10" idx="7"/>
+            <a:endCxn id="12" idx="3"/>
+          </p:cNvCxnSpPr>
+          <p:nvPr/>
+        </p:nvCxnSpPr>
+        <p:spPr>
+          <a:xfrm flipV="1">
+            <a:off x="6246989" y="2168058"/>
+            <a:ext cx="1629652" cy="1434292"/>
+          </a:xfrm>
+          <a:prstGeom prst="straightConnector1">
+            <a:avLst/>
+          </a:prstGeom>
+          <a:ln w="31750" cmpd="sng">
+            <a:prstDash val="dash"/>
+            <a:tailEnd type="triangle"/>
+          </a:ln>
+        </p:spPr>
+        <p:style>
+          <a:lnRef idx="1">
+            <a:schemeClr val="accent1"/>
+          </a:lnRef>
+          <a:fillRef idx="0">
+            <a:schemeClr val="accent1"/>
+          </a:fillRef>
+          <a:effectRef idx="0">
+            <a:schemeClr val="accent1"/>
+          </a:effectRef>
+          <a:fontRef idx="minor">
+            <a:schemeClr val="tx1"/>
+          </a:fontRef>
+        </p:style>
+      </p:cxnSp>
+      <p:cxnSp>
+        <p:nvCxnSpPr>
+          <p:cNvPr id="30" name="Conector de Seta Reta 29">
+            <a:extLst>
+              <a:ext uri="{FF2B5EF4-FFF2-40B4-BE49-F238E27FC236}">
+                <a16:creationId xmlns:a16="http://schemas.microsoft.com/office/drawing/2014/main" id="{087CF0E2-0C26-4D4E-A6BF-98DDEBC0FA53}"/>
+              </a:ext>
+            </a:extLst>
+          </p:cNvPr>
+          <p:cNvCxnSpPr>
+            <a:stCxn id="7" idx="6"/>
+            <a:endCxn id="12" idx="2"/>
+          </p:cNvCxnSpPr>
+          <p:nvPr/>
+        </p:nvCxnSpPr>
+        <p:spPr>
+          <a:xfrm flipV="1">
+            <a:off x="4778585" y="1999535"/>
+            <a:ext cx="3021129" cy="1504"/>
+          </a:xfrm>
+          <a:prstGeom prst="straightConnector1">
+            <a:avLst/>
+          </a:prstGeom>
+          <a:ln w="31750" cmpd="sng">
+            <a:prstDash val="dash"/>
+            <a:tailEnd type="triangle"/>
+          </a:ln>
+        </p:spPr>
+        <p:style>
+          <a:lnRef idx="1">
+            <a:schemeClr val="accent1"/>
+          </a:lnRef>
+          <a:fillRef idx="0">
+            <a:schemeClr val="accent1"/>
+          </a:fillRef>
+          <a:effectRef idx="0">
+            <a:schemeClr val="accent1"/>
+          </a:effectRef>
+          <a:fontRef idx="minor">
+            <a:schemeClr val="tx1"/>
+          </a:fontRef>
+        </p:style>
+      </p:cxnSp>
+      <p:cxnSp>
+        <p:nvCxnSpPr>
+          <p:cNvPr id="32" name="Conector de Seta Reta 31">
+            <a:extLst>
+              <a:ext uri="{FF2B5EF4-FFF2-40B4-BE49-F238E27FC236}">
+                <a16:creationId xmlns:a16="http://schemas.microsoft.com/office/drawing/2014/main" id="{1C1DEDD5-313D-4FB9-AE49-01B746DFD450}"/>
+              </a:ext>
+            </a:extLst>
+          </p:cNvPr>
+          <p:cNvCxnSpPr>
+            <a:stCxn id="12" idx="6"/>
+            <a:endCxn id="14" idx="2"/>
+          </p:cNvCxnSpPr>
+          <p:nvPr/>
+        </p:nvCxnSpPr>
+        <p:spPr>
+          <a:xfrm>
+            <a:off x="8325007" y="1999535"/>
+            <a:ext cx="1933201" cy="0"/>
+          </a:xfrm>
+          <a:prstGeom prst="straightConnector1">
+            <a:avLst/>
+          </a:prstGeom>
+          <a:ln>
+            <a:tailEnd type="triangle"/>
+          </a:ln>
+        </p:spPr>
+        <p:style>
+          <a:lnRef idx="1">
+            <a:schemeClr val="accent1"/>
+          </a:lnRef>
+          <a:fillRef idx="0">
+            <a:schemeClr val="accent1"/>
+          </a:fillRef>
+          <a:effectRef idx="0">
+            <a:schemeClr val="accent1"/>
+          </a:effectRef>
+          <a:fontRef idx="minor">
+            <a:schemeClr val="tx1"/>
+          </a:fontRef>
+        </p:style>
+      </p:cxnSp>
+      <p:cxnSp>
+        <p:nvCxnSpPr>
+          <p:cNvPr id="35" name="Conector de Seta Reta 34">
+            <a:extLst>
+              <a:ext uri="{FF2B5EF4-FFF2-40B4-BE49-F238E27FC236}">
+                <a16:creationId xmlns:a16="http://schemas.microsoft.com/office/drawing/2014/main" id="{1D9FDE0A-80A9-457C-A5CA-AA6FC00B6024}"/>
+              </a:ext>
+            </a:extLst>
+          </p:cNvPr>
+          <p:cNvCxnSpPr/>
+          <p:nvPr/>
+        </p:nvCxnSpPr>
+        <p:spPr>
+          <a:xfrm>
+            <a:off x="1509481" y="5856050"/>
+            <a:ext cx="9766570" cy="0"/>
+          </a:xfrm>
+          <a:prstGeom prst="straightConnector1">
+            <a:avLst/>
+          </a:prstGeom>
+          <a:ln>
+            <a:tailEnd type="triangle"/>
+          </a:ln>
+        </p:spPr>
+        <p:style>
+          <a:lnRef idx="1">
+            <a:schemeClr val="accent1"/>
+          </a:lnRef>
+          <a:fillRef idx="0">
+            <a:schemeClr val="accent1"/>
+          </a:fillRef>
+          <a:effectRef idx="0">
+            <a:schemeClr val="accent1"/>
+          </a:effectRef>
+          <a:fontRef idx="minor">
+            <a:schemeClr val="tx1"/>
+          </a:fontRef>
+        </p:style>
+      </p:cxnSp>
+      <p:cxnSp>
+        <p:nvCxnSpPr>
+          <p:cNvPr id="37" name="Conector de Seta Reta 36">
+            <a:extLst>
+              <a:ext uri="{FF2B5EF4-FFF2-40B4-BE49-F238E27FC236}">
+                <a16:creationId xmlns:a16="http://schemas.microsoft.com/office/drawing/2014/main" id="{6CAFDEC3-4221-4B06-AF56-1B813C8B1FFC}"/>
+              </a:ext>
+            </a:extLst>
+          </p:cNvPr>
+          <p:cNvCxnSpPr/>
+          <p:nvPr/>
+        </p:nvCxnSpPr>
+        <p:spPr>
+          <a:xfrm flipV="1">
+            <a:off x="1509481" y="642025"/>
+            <a:ext cx="0" cy="5223753"/>
+          </a:xfrm>
+          <a:prstGeom prst="straightConnector1">
+            <a:avLst/>
+          </a:prstGeom>
+          <a:ln>
+            <a:tailEnd type="triangle"/>
+          </a:ln>
+        </p:spPr>
+        <p:style>
+          <a:lnRef idx="1">
+            <a:schemeClr val="accent1"/>
+          </a:lnRef>
+          <a:fillRef idx="0">
+            <a:schemeClr val="accent1"/>
+          </a:fillRef>
+          <a:effectRef idx="0">
+            <a:schemeClr val="accent1"/>
+          </a:effectRef>
+          <a:fontRef idx="minor">
+            <a:schemeClr val="tx1"/>
+          </a:fontRef>
+        </p:style>
+      </p:cxnSp>
+      <p:sp>
+        <p:nvSpPr>
+          <p:cNvPr id="38" name="CaixaDeTexto 37">
+            <a:extLst>
+              <a:ext uri="{FF2B5EF4-FFF2-40B4-BE49-F238E27FC236}">
+                <a16:creationId xmlns:a16="http://schemas.microsoft.com/office/drawing/2014/main" id="{7F66A606-E16F-4822-8EAF-74658A395AAD}"/>
+              </a:ext>
+            </a:extLst>
+          </p:cNvPr>
+          <p:cNvSpPr txBox="1"/>
+          <p:nvPr/>
+        </p:nvSpPr>
+        <p:spPr>
+          <a:xfrm>
+            <a:off x="10550037" y="5302053"/>
+            <a:ext cx="466927" cy="369332"/>
+          </a:xfrm>
+          <a:prstGeom prst="rect">
+            <a:avLst/>
+          </a:prstGeom>
+          <a:noFill/>
+        </p:spPr>
+        <p:txBody>
+          <a:bodyPr wrap="square" rtlCol="0">
+            <a:spAutoFit/>
+          </a:bodyPr>
+          <a:lstStyle/>
+          <a:p>
+            <a:r>
+              <a:rPr lang="pt-BR" dirty="0"/>
+              <a:t>X</a:t>
+            </a:r>
+          </a:p>
+        </p:txBody>
+      </p:sp>
+      <p:sp>
+        <p:nvSpPr>
+          <p:cNvPr id="39" name="CaixaDeTexto 38">
+            <a:extLst>
+              <a:ext uri="{FF2B5EF4-FFF2-40B4-BE49-F238E27FC236}">
+                <a16:creationId xmlns:a16="http://schemas.microsoft.com/office/drawing/2014/main" id="{DD05E20D-A4E4-4700-B38A-1FED0A088421}"/>
+              </a:ext>
+            </a:extLst>
+          </p:cNvPr>
+          <p:cNvSpPr txBox="1"/>
+          <p:nvPr/>
+        </p:nvSpPr>
+        <p:spPr>
+          <a:xfrm>
+            <a:off x="1785276" y="483859"/>
+            <a:ext cx="466927" cy="369332"/>
+          </a:xfrm>
+          <a:prstGeom prst="rect">
+            <a:avLst/>
+          </a:prstGeom>
+          <a:noFill/>
+        </p:spPr>
+        <p:txBody>
+          <a:bodyPr wrap="square" rtlCol="0">
+            <a:spAutoFit/>
+          </a:bodyPr>
+          <a:lstStyle/>
+          <a:p>
+            <a:r>
+              <a:rPr lang="pt-BR" dirty="0"/>
+              <a:t>Y</a:t>
+            </a:r>
+          </a:p>
+        </p:txBody>
+      </p:sp>
+      <p:cxnSp>
+        <p:nvCxnSpPr>
+          <p:cNvPr id="41" name="Conector de Seta Reta 40">
+            <a:extLst>
+              <a:ext uri="{FF2B5EF4-FFF2-40B4-BE49-F238E27FC236}">
+                <a16:creationId xmlns:a16="http://schemas.microsoft.com/office/drawing/2014/main" id="{EF1072E9-3AF8-41AA-BB41-4681E4BF6504}"/>
+              </a:ext>
+            </a:extLst>
+          </p:cNvPr>
+          <p:cNvCxnSpPr>
+            <a:stCxn id="11" idx="7"/>
+            <a:endCxn id="12" idx="4"/>
+          </p:cNvCxnSpPr>
+          <p:nvPr/>
+        </p:nvCxnSpPr>
+        <p:spPr>
+          <a:xfrm flipV="1">
+            <a:off x="7851424" y="2237863"/>
+            <a:ext cx="210937" cy="2633545"/>
+          </a:xfrm>
+          <a:prstGeom prst="straightConnector1">
+            <a:avLst/>
+          </a:prstGeom>
+          <a:ln w="31750" cmpd="sng">
+            <a:prstDash val="dash"/>
+            <a:tailEnd type="triangle"/>
+          </a:ln>
+        </p:spPr>
+        <p:style>
+          <a:lnRef idx="1">
+            <a:schemeClr val="accent1"/>
+          </a:lnRef>
+          <a:fillRef idx="0">
+            <a:schemeClr val="accent1"/>
+          </a:fillRef>
+          <a:effectRef idx="0">
+            <a:schemeClr val="accent1"/>
+          </a:effectRef>
+          <a:fontRef idx="minor">
+            <a:schemeClr val="tx1"/>
+          </a:fontRef>
+        </p:style>
+      </p:cxnSp>
+    </p:spTree>
+    <p:extLst>
+      <p:ext uri="{BB962C8B-B14F-4D97-AF65-F5344CB8AC3E}">
+        <p14:creationId xmlns:p14="http://schemas.microsoft.com/office/powerpoint/2010/main" val="2639653684"/>
+      </p:ext>
+    </p:extLst>
+  </p:cSld>
+  <p:clrMapOvr>
+    <a:masterClrMapping/>
+  </p:clrMapOvr>
+</p:sld>
+</file>
+
 <file path=ppt/theme/theme1.xml><?xml version="1.0" encoding="utf-8"?>
 <a:theme xmlns:a="http://schemas.openxmlformats.org/drawingml/2006/main" name="Tema do Office">
   <a:themeElements>

</xml_diff>

<commit_message>
adcionado gerenciador de voo
</commit_message>
<xml_diff>
--- a/doc/pfc/Imagens/Imagens.pptx
+++ b/doc/pfc/Imagens/Imagens.pptx
@@ -14,6 +14,7 @@
     <p:sldId id="262" r:id="rId8"/>
     <p:sldId id="263" r:id="rId9"/>
     <p:sldId id="264" r:id="rId10"/>
+    <p:sldId id="265" r:id="rId11"/>
   </p:sldIdLst>
   <p:sldSz cx="12192000" cy="6858000"/>
   <p:notesSz cx="6858000" cy="9144000"/>
@@ -3426,6 +3427,389 @@
 </p:sld>
 </file>
 
+<file path=ppt/slides/slide10.xml><?xml version="1.0" encoding="utf-8"?>
+<p:sld xmlns:a="http://schemas.openxmlformats.org/drawingml/2006/main" xmlns:r="http://schemas.openxmlformats.org/officeDocument/2006/relationships" xmlns:p="http://schemas.openxmlformats.org/presentationml/2006/main">
+  <p:cSld>
+    <p:spTree>
+      <p:nvGrpSpPr>
+        <p:cNvPr id="1" name=""/>
+        <p:cNvGrpSpPr/>
+        <p:nvPr/>
+      </p:nvGrpSpPr>
+      <p:grpSpPr>
+        <a:xfrm>
+          <a:off x="0" y="0"/>
+          <a:ext cx="0" cy="0"/>
+          <a:chOff x="0" y="0"/>
+          <a:chExt cx="0" cy="0"/>
+        </a:xfrm>
+      </p:grpSpPr>
+      <p:pic>
+        <p:nvPicPr>
+          <p:cNvPr id="5" name="Imagem 4">
+            <a:extLst>
+              <a:ext uri="{FF2B5EF4-FFF2-40B4-BE49-F238E27FC236}">
+                <a16:creationId xmlns:a16="http://schemas.microsoft.com/office/drawing/2014/main" id="{D723555D-494F-4EFD-8F28-5D251C7FABBD}"/>
+              </a:ext>
+            </a:extLst>
+          </p:cNvPr>
+          <p:cNvPicPr>
+            <a:picLocks noChangeAspect="1"/>
+          </p:cNvPicPr>
+          <p:nvPr/>
+        </p:nvPicPr>
+        <p:blipFill>
+          <a:blip r:embed="rId2">
+            <a:extLst>
+              <a:ext uri="{28A0092B-C50C-407E-A947-70E740481C1C}">
+                <a14:useLocalDpi xmlns:a14="http://schemas.microsoft.com/office/drawing/2010/main" val="0"/>
+              </a:ext>
+            </a:extLst>
+          </a:blip>
+          <a:stretch>
+            <a:fillRect/>
+          </a:stretch>
+        </p:blipFill>
+        <p:spPr>
+          <a:xfrm>
+            <a:off x="4167187" y="0"/>
+            <a:ext cx="3857625" cy="6858000"/>
+          </a:xfrm>
+          <a:prstGeom prst="rect">
+            <a:avLst/>
+          </a:prstGeom>
+        </p:spPr>
+      </p:pic>
+      <p:cxnSp>
+        <p:nvCxnSpPr>
+          <p:cNvPr id="6" name="Conector de Seta Reta 5">
+            <a:extLst>
+              <a:ext uri="{FF2B5EF4-FFF2-40B4-BE49-F238E27FC236}">
+                <a16:creationId xmlns:a16="http://schemas.microsoft.com/office/drawing/2014/main" id="{12B586FE-84D5-481B-987B-72DC86A8817E}"/>
+              </a:ext>
+            </a:extLst>
+          </p:cNvPr>
+          <p:cNvCxnSpPr/>
+          <p:nvPr/>
+        </p:nvCxnSpPr>
+        <p:spPr>
+          <a:xfrm>
+            <a:off x="6649023" y="6070862"/>
+            <a:ext cx="1175158" cy="0"/>
+          </a:xfrm>
+          <a:prstGeom prst="straightConnector1">
+            <a:avLst/>
+          </a:prstGeom>
+          <a:ln w="38100">
+            <a:solidFill>
+              <a:schemeClr val="accent4"/>
+            </a:solidFill>
+            <a:headEnd type="triangle"/>
+            <a:tailEnd type="triangle"/>
+          </a:ln>
+        </p:spPr>
+        <p:style>
+          <a:lnRef idx="1">
+            <a:schemeClr val="accent1"/>
+          </a:lnRef>
+          <a:fillRef idx="0">
+            <a:schemeClr val="accent1"/>
+          </a:fillRef>
+          <a:effectRef idx="0">
+            <a:schemeClr val="accent1"/>
+          </a:effectRef>
+          <a:fontRef idx="minor">
+            <a:schemeClr val="tx1"/>
+          </a:fontRef>
+        </p:style>
+      </p:cxnSp>
+      <p:cxnSp>
+        <p:nvCxnSpPr>
+          <p:cNvPr id="7" name="Conector de Seta Reta 6">
+            <a:extLst>
+              <a:ext uri="{FF2B5EF4-FFF2-40B4-BE49-F238E27FC236}">
+                <a16:creationId xmlns:a16="http://schemas.microsoft.com/office/drawing/2014/main" id="{47CAB3A8-B121-433A-AFB8-13F8397D513D}"/>
+              </a:ext>
+            </a:extLst>
+          </p:cNvPr>
+          <p:cNvCxnSpPr>
+            <a:cxnSpLocks/>
+          </p:cNvCxnSpPr>
+          <p:nvPr/>
+        </p:nvCxnSpPr>
+        <p:spPr>
+          <a:xfrm>
+            <a:off x="7236602" y="5569118"/>
+            <a:ext cx="0" cy="1003487"/>
+          </a:xfrm>
+          <a:prstGeom prst="straightConnector1">
+            <a:avLst/>
+          </a:prstGeom>
+          <a:ln w="38100">
+            <a:solidFill>
+              <a:schemeClr val="accent4"/>
+            </a:solidFill>
+            <a:headEnd type="triangle"/>
+            <a:tailEnd type="triangle"/>
+          </a:ln>
+        </p:spPr>
+        <p:style>
+          <a:lnRef idx="1">
+            <a:schemeClr val="accent1"/>
+          </a:lnRef>
+          <a:fillRef idx="0">
+            <a:schemeClr val="accent1"/>
+          </a:fillRef>
+          <a:effectRef idx="0">
+            <a:schemeClr val="accent1"/>
+          </a:effectRef>
+          <a:fontRef idx="minor">
+            <a:schemeClr val="tx1"/>
+          </a:fontRef>
+        </p:style>
+      </p:cxnSp>
+      <p:cxnSp>
+        <p:nvCxnSpPr>
+          <p:cNvPr id="8" name="Conector de Seta Reta 7">
+            <a:extLst>
+              <a:ext uri="{FF2B5EF4-FFF2-40B4-BE49-F238E27FC236}">
+                <a16:creationId xmlns:a16="http://schemas.microsoft.com/office/drawing/2014/main" id="{A579F5C5-5AB3-4F9A-B936-7799DC64CBEF}"/>
+              </a:ext>
+            </a:extLst>
+          </p:cNvPr>
+          <p:cNvCxnSpPr/>
+          <p:nvPr/>
+        </p:nvCxnSpPr>
+        <p:spPr>
+          <a:xfrm>
+            <a:off x="4385001" y="6065215"/>
+            <a:ext cx="1175158" cy="0"/>
+          </a:xfrm>
+          <a:prstGeom prst="straightConnector1">
+            <a:avLst/>
+          </a:prstGeom>
+          <a:ln w="38100">
+            <a:solidFill>
+              <a:schemeClr val="accent4"/>
+            </a:solidFill>
+            <a:headEnd type="triangle"/>
+            <a:tailEnd type="triangle"/>
+          </a:ln>
+        </p:spPr>
+        <p:style>
+          <a:lnRef idx="1">
+            <a:schemeClr val="accent1"/>
+          </a:lnRef>
+          <a:fillRef idx="0">
+            <a:schemeClr val="accent1"/>
+          </a:fillRef>
+          <a:effectRef idx="0">
+            <a:schemeClr val="accent1"/>
+          </a:effectRef>
+          <a:fontRef idx="minor">
+            <a:schemeClr val="tx1"/>
+          </a:fontRef>
+        </p:style>
+      </p:cxnSp>
+      <p:cxnSp>
+        <p:nvCxnSpPr>
+          <p:cNvPr id="9" name="Conector de Seta Reta 8">
+            <a:extLst>
+              <a:ext uri="{FF2B5EF4-FFF2-40B4-BE49-F238E27FC236}">
+                <a16:creationId xmlns:a16="http://schemas.microsoft.com/office/drawing/2014/main" id="{87C01952-FFA2-4CF6-9834-2AA18077E240}"/>
+              </a:ext>
+            </a:extLst>
+          </p:cNvPr>
+          <p:cNvCxnSpPr>
+            <a:cxnSpLocks/>
+          </p:cNvCxnSpPr>
+          <p:nvPr/>
+        </p:nvCxnSpPr>
+        <p:spPr>
+          <a:xfrm>
+            <a:off x="4972580" y="5563471"/>
+            <a:ext cx="0" cy="1003487"/>
+          </a:xfrm>
+          <a:prstGeom prst="straightConnector1">
+            <a:avLst/>
+          </a:prstGeom>
+          <a:ln w="38100">
+            <a:solidFill>
+              <a:schemeClr val="accent4"/>
+            </a:solidFill>
+            <a:headEnd type="triangle"/>
+            <a:tailEnd type="triangle"/>
+          </a:ln>
+        </p:spPr>
+        <p:style>
+          <a:lnRef idx="1">
+            <a:schemeClr val="accent1"/>
+          </a:lnRef>
+          <a:fillRef idx="0">
+            <a:schemeClr val="accent1"/>
+          </a:fillRef>
+          <a:effectRef idx="0">
+            <a:schemeClr val="accent1"/>
+          </a:effectRef>
+          <a:fontRef idx="minor">
+            <a:schemeClr val="tx1"/>
+          </a:fontRef>
+        </p:style>
+      </p:cxnSp>
+      <p:sp>
+        <p:nvSpPr>
+          <p:cNvPr id="10" name="CaixaDeTexto 9">
+            <a:extLst>
+              <a:ext uri="{FF2B5EF4-FFF2-40B4-BE49-F238E27FC236}">
+                <a16:creationId xmlns:a16="http://schemas.microsoft.com/office/drawing/2014/main" id="{BC7A4AD5-7A70-4D1C-85D0-9D44467C8953}"/>
+              </a:ext>
+            </a:extLst>
+          </p:cNvPr>
+          <p:cNvSpPr txBox="1"/>
+          <p:nvPr/>
+        </p:nvSpPr>
+        <p:spPr>
+          <a:xfrm>
+            <a:off x="3700680" y="5880548"/>
+            <a:ext cx="587567" cy="369332"/>
+          </a:xfrm>
+          <a:prstGeom prst="rect">
+            <a:avLst/>
+          </a:prstGeom>
+          <a:noFill/>
+        </p:spPr>
+        <p:txBody>
+          <a:bodyPr wrap="square" rtlCol="0">
+            <a:spAutoFit/>
+          </a:bodyPr>
+          <a:lstStyle/>
+          <a:p>
+            <a:r>
+              <a:rPr lang="pt-BR" dirty="0"/>
+              <a:t>Yaw</a:t>
+            </a:r>
+          </a:p>
+        </p:txBody>
+      </p:sp>
+      <p:sp>
+        <p:nvSpPr>
+          <p:cNvPr id="11" name="CaixaDeTexto 10">
+            <a:extLst>
+              <a:ext uri="{FF2B5EF4-FFF2-40B4-BE49-F238E27FC236}">
+                <a16:creationId xmlns:a16="http://schemas.microsoft.com/office/drawing/2014/main" id="{51558362-A68D-46FC-BA68-445A758AD33C}"/>
+              </a:ext>
+            </a:extLst>
+          </p:cNvPr>
+          <p:cNvSpPr txBox="1"/>
+          <p:nvPr/>
+        </p:nvSpPr>
+        <p:spPr>
+          <a:xfrm>
+            <a:off x="4579008" y="6554128"/>
+            <a:ext cx="787144" cy="369332"/>
+          </a:xfrm>
+          <a:prstGeom prst="rect">
+            <a:avLst/>
+          </a:prstGeom>
+          <a:noFill/>
+        </p:spPr>
+        <p:txBody>
+          <a:bodyPr wrap="square" rtlCol="0">
+            <a:spAutoFit/>
+          </a:bodyPr>
+          <a:lstStyle/>
+          <a:p>
+            <a:r>
+              <a:rPr lang="pt-BR" dirty="0" err="1"/>
+              <a:t>Thrust</a:t>
+            </a:r>
+            <a:endParaRPr lang="pt-BR" dirty="0"/>
+          </a:p>
+        </p:txBody>
+      </p:sp>
+      <p:sp>
+        <p:nvSpPr>
+          <p:cNvPr id="12" name="CaixaDeTexto 11">
+            <a:extLst>
+              <a:ext uri="{FF2B5EF4-FFF2-40B4-BE49-F238E27FC236}">
+                <a16:creationId xmlns:a16="http://schemas.microsoft.com/office/drawing/2014/main" id="{13C08613-76FB-461F-B419-2314972E9A3D}"/>
+              </a:ext>
+            </a:extLst>
+          </p:cNvPr>
+          <p:cNvSpPr txBox="1"/>
+          <p:nvPr/>
+        </p:nvSpPr>
+        <p:spPr>
+          <a:xfrm>
+            <a:off x="6077146" y="5880548"/>
+            <a:ext cx="608287" cy="369332"/>
+          </a:xfrm>
+          <a:prstGeom prst="rect">
+            <a:avLst/>
+          </a:prstGeom>
+          <a:noFill/>
+        </p:spPr>
+        <p:txBody>
+          <a:bodyPr wrap="square" rtlCol="0">
+            <a:spAutoFit/>
+          </a:bodyPr>
+          <a:lstStyle/>
+          <a:p>
+            <a:r>
+              <a:rPr lang="pt-BR" dirty="0"/>
+              <a:t>Roll</a:t>
+            </a:r>
+          </a:p>
+        </p:txBody>
+      </p:sp>
+      <p:sp>
+        <p:nvSpPr>
+          <p:cNvPr id="13" name="CaixaDeTexto 12">
+            <a:extLst>
+              <a:ext uri="{FF2B5EF4-FFF2-40B4-BE49-F238E27FC236}">
+                <a16:creationId xmlns:a16="http://schemas.microsoft.com/office/drawing/2014/main" id="{40B583FB-D7E2-44E5-A2BF-E01DF7F5D34F}"/>
+              </a:ext>
+            </a:extLst>
+          </p:cNvPr>
+          <p:cNvSpPr txBox="1"/>
+          <p:nvPr/>
+        </p:nvSpPr>
+        <p:spPr>
+          <a:xfrm>
+            <a:off x="6933977" y="6578253"/>
+            <a:ext cx="890196" cy="369332"/>
+          </a:xfrm>
+          <a:prstGeom prst="rect">
+            <a:avLst/>
+          </a:prstGeom>
+          <a:noFill/>
+        </p:spPr>
+        <p:txBody>
+          <a:bodyPr wrap="square" rtlCol="0">
+            <a:spAutoFit/>
+          </a:bodyPr>
+          <a:lstStyle/>
+          <a:p>
+            <a:r>
+              <a:rPr lang="pt-BR" dirty="0"/>
+              <a:t>Pitch</a:t>
+            </a:r>
+          </a:p>
+        </p:txBody>
+      </p:sp>
+    </p:spTree>
+    <p:extLst>
+      <p:ext uri="{BB962C8B-B14F-4D97-AF65-F5344CB8AC3E}">
+        <p14:creationId xmlns:p14="http://schemas.microsoft.com/office/powerpoint/2010/main" val="2141960951"/>
+      </p:ext>
+    </p:extLst>
+  </p:cSld>
+  <p:clrMapOvr>
+    <a:masterClrMapping/>
+  </p:clrMapOvr>
+</p:sld>
+</file>
+
 <file path=ppt/slides/slide2.xml><?xml version="1.0" encoding="utf-8"?>
 <p:sld xmlns:a="http://schemas.openxmlformats.org/drawingml/2006/main" xmlns:r="http://schemas.openxmlformats.org/officeDocument/2006/relationships" xmlns:p="http://schemas.openxmlformats.org/presentationml/2006/main">
   <p:cSld>

</xml_diff>